<commit_message>
Update Keynote and PowerPoint with images. Remove R presentation.
</commit_message>
<xml_diff>
--- a/presentation/inaugural_meeting_2016-10-05_presentation.pptx
+++ b/presentation/inaugural_meeting_2016-10-05_presentation.pptx
@@ -17,6 +17,7 @@
     <p:sldId id="262" r:id="rId14"/>
     <p:sldId id="263" r:id="rId15"/>
     <p:sldId id="264" r:id="rId16"/>
+    <p:sldId id="265" r:id="rId17"/>
   </p:sldIdLst>
   <p:sldSz cx="13004800" cy="9753600"/>
   <p:notesSz cx="6858000" cy="9144000"/>
@@ -518,7 +519,7 @@
       </p:grpSpPr>
       <p:sp>
         <p:nvSpPr>
-          <p:cNvPr id="123" name="Shape 123"/>
+          <p:cNvPr id="125" name="Shape 125"/>
           <p:cNvSpPr/>
           <p:nvPr>
             <p:ph type="sldImg"/>
@@ -539,7 +540,7 @@
       </p:sp>
       <p:sp>
         <p:nvSpPr>
-          <p:cNvPr id="124" name="Shape 124"/>
+          <p:cNvPr id="126" name="Shape 126"/>
           <p:cNvSpPr/>
           <p:nvPr>
             <p:ph type="body" sz="quarter" idx="1"/>
@@ -588,7 +589,7 @@
       </p:grpSpPr>
       <p:sp>
         <p:nvSpPr>
-          <p:cNvPr id="129" name="Shape 129"/>
+          <p:cNvPr id="131" name="Shape 131"/>
           <p:cNvSpPr/>
           <p:nvPr>
             <p:ph type="sldImg"/>
@@ -609,7 +610,7 @@
       </p:sp>
       <p:sp>
         <p:nvSpPr>
-          <p:cNvPr id="130" name="Shape 130"/>
+          <p:cNvPr id="132" name="Shape 132"/>
           <p:cNvSpPr/>
           <p:nvPr>
             <p:ph type="body" sz="quarter" idx="1"/>
@@ -694,21 +695,9 @@
           <a:bodyPr/>
           <a:lstStyle/>
           <a:p>
-            <a:pPr marL="271638" indent="-271638">
-              <a:buSzPct val="75000"/>
-              <a:buChar char="-"/>
-            </a:pPr>
+            <a:pPr/>
             <a:r>
-              <a:t>other aspect, e.g. Markdown and Shiny</a:t>
-            </a:r>
-          </a:p>
-          <a:p>
-            <a:pPr marL="271638" indent="-271638">
-              <a:buSzPct val="75000"/>
-              <a:buChar char="-"/>
-            </a:pPr>
-            <a:r>
-              <a:t>all over the place though in terms of tutorials in general</a:t>
+              <a:t>- top three</a:t>
             </a:r>
           </a:p>
         </p:txBody>
@@ -740,7 +729,7 @@
       </p:grpSpPr>
       <p:sp>
         <p:nvSpPr>
-          <p:cNvPr id="188" name="Shape 188"/>
+          <p:cNvPr id="190" name="Shape 190"/>
           <p:cNvSpPr/>
           <p:nvPr>
             <p:ph type="sldImg"/>
@@ -761,7 +750,7 @@
       </p:sp>
       <p:sp>
         <p:nvSpPr>
-          <p:cNvPr id="189" name="Shape 189"/>
+          <p:cNvPr id="191" name="Shape 191"/>
           <p:cNvSpPr/>
           <p:nvPr>
             <p:ph type="body" sz="quarter" idx="1"/>
@@ -776,9 +765,21 @@
           <a:bodyPr/>
           <a:lstStyle/>
           <a:p>
-            <a:pPr/>
+            <a:pPr marL="271638" indent="-271638">
+              <a:buSzPct val="75000"/>
+              <a:buChar char="-"/>
+            </a:pPr>
             <a:r>
-              <a:t>- top three</a:t>
+              <a:t>other aspect, e.g. Markdown and Shiny</a:t>
+            </a:r>
+          </a:p>
+          <a:p>
+            <a:pPr marL="271638" indent="-271638">
+              <a:buSzPct val="75000"/>
+              <a:buChar char="-"/>
+            </a:pPr>
+            <a:r>
+              <a:t>all over the place though in terms of tutorials in general</a:t>
             </a:r>
           </a:p>
         </p:txBody>
@@ -810,7 +811,7 @@
       </p:grpSpPr>
       <p:sp>
         <p:nvSpPr>
-          <p:cNvPr id="195" name="Shape 195"/>
+          <p:cNvPr id="197" name="Shape 197"/>
           <p:cNvSpPr/>
           <p:nvPr>
             <p:ph type="sldImg"/>
@@ -831,7 +832,7 @@
       </p:sp>
       <p:sp>
         <p:nvSpPr>
-          <p:cNvPr id="196" name="Shape 196"/>
+          <p:cNvPr id="198" name="Shape 198"/>
           <p:cNvSpPr/>
           <p:nvPr>
             <p:ph type="body" sz="quarter" idx="1"/>
@@ -849,6 +850,112 @@
             <a:pPr/>
             <a:r>
               <a:t>- focus on this one b/c I’m not sure if everyone means the same thing</a:t>
+            </a:r>
+          </a:p>
+        </p:txBody>
+      </p:sp>
+    </p:spTree>
+  </p:cSld>
+  <p:clrMapOvr>
+    <a:masterClrMapping/>
+  </p:clrMapOvr>
+</p:notes>
+</file>
+
+<file path=ppt/notesSlides/notesSlide6.xml><?xml version="1.0" encoding="utf-8"?>
+<p:notes xmlns:a="http://schemas.openxmlformats.org/drawingml/2006/main" xmlns:r="http://schemas.openxmlformats.org/officeDocument/2006/relationships" xmlns:p="http://schemas.openxmlformats.org/presentationml/2006/main" showMasterSp="1" showMasterPhAnim="1">
+  <p:cSld>
+    <p:spTree>
+      <p:nvGrpSpPr>
+        <p:cNvPr id="1" name=""/>
+        <p:cNvGrpSpPr/>
+        <p:nvPr/>
+      </p:nvGrpSpPr>
+      <p:grpSpPr>
+        <a:xfrm>
+          <a:off x="0" y="0"/>
+          <a:ext cx="0" cy="0"/>
+          <a:chOff x="0" y="0"/>
+          <a:chExt cx="0" cy="0"/>
+        </a:xfrm>
+      </p:grpSpPr>
+      <p:sp>
+        <p:nvSpPr>
+          <p:cNvPr id="212" name="Shape 212"/>
+          <p:cNvSpPr/>
+          <p:nvPr>
+            <p:ph type="sldImg"/>
+          </p:nvPr>
+        </p:nvSpPr>
+        <p:spPr>
+          <a:prstGeom prst="rect">
+            <a:avLst/>
+          </a:prstGeom>
+        </p:spPr>
+        <p:txBody>
+          <a:bodyPr/>
+          <a:lstStyle/>
+          <a:p>
+            <a:pPr/>
+          </a:p>
+        </p:txBody>
+      </p:sp>
+      <p:sp>
+        <p:nvSpPr>
+          <p:cNvPr id="213" name="Shape 213"/>
+          <p:cNvSpPr/>
+          <p:nvPr>
+            <p:ph type="body" sz="quarter" idx="1"/>
+          </p:nvPr>
+        </p:nvSpPr>
+        <p:spPr>
+          <a:prstGeom prst="rect">
+            <a:avLst/>
+          </a:prstGeom>
+        </p:spPr>
+        <p:txBody>
+          <a:bodyPr/>
+          <a:lstStyle/>
+          <a:p>
+            <a:pPr marL="271638" indent="-271638">
+              <a:buSzPct val="75000"/>
+              <a:buChar char="-"/>
+            </a:pPr>
+            <a:r>
+              <a:t>speakers include ppl who want to speak and suggestions for speakers (some ppl said yes in initial survey)</a:t>
+            </a:r>
+          </a:p>
+          <a:p>
+            <a:pPr lvl="1" marL="716138" indent="-271638">
+              <a:buSzPct val="75000"/>
+              <a:buChar char="-"/>
+            </a:pPr>
+            <a:r>
+              <a:t>I have done small tutorials on dplyr/tidyr or ggplot2 at INRA that I could recycle depending in the desired level. Otherwise potentially the use of Bioconductor packages.</a:t>
+            </a:r>
+          </a:p>
+          <a:p>
+            <a:pPr lvl="1" marL="716138" indent="-271638">
+              <a:buSzPct val="75000"/>
+              <a:buChar char="-"/>
+            </a:pPr>
+            <a:r>
+              <a:t>analyzing eye-tracking data</a:t>
+            </a:r>
+          </a:p>
+          <a:p>
+            <a:pPr lvl="1" marL="716138" indent="-271638">
+              <a:buSzPct val="75000"/>
+              <a:buChar char="-"/>
+            </a:pPr>
+            <a:r>
+              <a:t>missing values</a:t>
+            </a:r>
+          </a:p>
+          <a:p>
+            <a:pPr/>
+            <a:r>
+              <a:t>- mention posters too</a:t>
             </a:r>
           </a:p>
         </p:txBody>
@@ -3458,12 +3565,638 @@
           </a:ln>
         </p:spPr>
       </p:pic>
+      <p:pic>
+        <p:nvPicPr>
+          <p:cNvPr id="123" name="Rladies2.png"/>
+          <p:cNvPicPr>
+            <a:picLocks noChangeAspect="1"/>
+          </p:cNvPicPr>
+          <p:nvPr/>
+        </p:nvPicPr>
+        <p:blipFill>
+          <a:blip r:embed="rId5">
+            <a:extLst/>
+          </a:blip>
+          <a:stretch>
+            <a:fillRect/>
+          </a:stretch>
+        </p:blipFill>
+        <p:spPr>
+          <a:xfrm>
+            <a:off x="9566082" y="96481"/>
+            <a:ext cx="3944805" cy="2540001"/>
+          </a:xfrm>
+          <a:prstGeom prst="rect">
+            <a:avLst/>
+          </a:prstGeom>
+          <a:ln w="12700">
+            <a:miter lim="400000"/>
+          </a:ln>
+        </p:spPr>
+      </p:pic>
+      <p:pic>
+        <p:nvPicPr>
+          <p:cNvPr id="124" name="pasted-image.pdf"/>
+          <p:cNvPicPr>
+            <a:picLocks noChangeAspect="1"/>
+          </p:cNvPicPr>
+          <p:nvPr/>
+        </p:nvPicPr>
+        <p:blipFill>
+          <a:blip r:embed="rId6">
+            <a:extLst/>
+          </a:blip>
+          <a:stretch>
+            <a:fillRect/>
+          </a:stretch>
+        </p:blipFill>
+        <p:spPr>
+          <a:xfrm>
+            <a:off x="236985" y="310655"/>
+            <a:ext cx="2314952" cy="2540001"/>
+          </a:xfrm>
+          <a:prstGeom prst="rect">
+            <a:avLst/>
+          </a:prstGeom>
+          <a:ln w="12700">
+            <a:miter lim="400000"/>
+          </a:ln>
+        </p:spPr>
+      </p:pic>
     </p:spTree>
   </p:cSld>
   <p:clrMapOvr>
     <a:masterClrMapping/>
   </p:clrMapOvr>
   <p:transition xmlns:p14="http://schemas.microsoft.com/office/powerpoint/2010/main" spd="med" advClick="1"/>
+</p:sld>
+</file>
+
+<file path=ppt/slides/slide10.xml><?xml version="1.0" encoding="utf-8"?>
+<p:sld xmlns:a="http://schemas.openxmlformats.org/drawingml/2006/main" xmlns:r="http://schemas.openxmlformats.org/officeDocument/2006/relationships" xmlns:p="http://schemas.openxmlformats.org/presentationml/2006/main" showMasterSp="1" showMasterPhAnim="1">
+  <p:cSld>
+    <p:spTree>
+      <p:nvGrpSpPr>
+        <p:cNvPr id="1" name=""/>
+        <p:cNvGrpSpPr/>
+        <p:nvPr/>
+      </p:nvGrpSpPr>
+      <p:grpSpPr>
+        <a:xfrm>
+          <a:off x="0" y="0"/>
+          <a:ext cx="0" cy="0"/>
+          <a:chOff x="0" y="0"/>
+          <a:chExt cx="0" cy="0"/>
+        </a:xfrm>
+      </p:grpSpPr>
+      <p:sp>
+        <p:nvSpPr>
+          <p:cNvPr id="205" name="Shape 205"/>
+          <p:cNvSpPr/>
+          <p:nvPr/>
+        </p:nvSpPr>
+        <p:spPr>
+          <a:xfrm>
+            <a:off x="1304290" y="357429"/>
+            <a:ext cx="10396221" cy="1625601"/>
+          </a:xfrm>
+          <a:prstGeom prst="rect">
+            <a:avLst/>
+          </a:prstGeom>
+          <a:ln w="12700">
+            <a:miter lim="400000"/>
+          </a:ln>
+          <a:extLst>
+            <a:ext uri="{C572A759-6A51-4108-AA02-DFA0A04FC94B}">
+              <ma14:wrappingTextBoxFlag xmlns:ma14="http://schemas.microsoft.com/office/mac/drawingml/2011/main" val="1"/>
+            </a:ext>
+          </a:extLst>
+        </p:spPr>
+        <p:txBody>
+          <a:bodyPr wrap="none" lIns="50800" tIns="50800" rIns="50800" bIns="50800" anchor="ctr">
+            <a:spAutoFit/>
+          </a:bodyPr>
+          <a:lstStyle>
+            <a:lvl1pPr>
+              <a:defRPr sz="10000"/>
+            </a:lvl1pPr>
+          </a:lstStyle>
+          <a:p>
+            <a:pPr/>
+            <a:r>
+              <a:t>Future meeting qs</a:t>
+            </a:r>
+          </a:p>
+        </p:txBody>
+      </p:sp>
+      <p:sp>
+        <p:nvSpPr>
+          <p:cNvPr id="206" name="Shape 206"/>
+          <p:cNvSpPr/>
+          <p:nvPr/>
+        </p:nvSpPr>
+        <p:spPr>
+          <a:xfrm>
+            <a:off x="1016317" y="2113732"/>
+            <a:ext cx="10972166" cy="863601"/>
+          </a:xfrm>
+          <a:prstGeom prst="rect">
+            <a:avLst/>
+          </a:prstGeom>
+          <a:ln w="12700">
+            <a:miter lim="400000"/>
+          </a:ln>
+          <a:extLst>
+            <a:ext uri="{C572A759-6A51-4108-AA02-DFA0A04FC94B}">
+              <ma14:wrappingTextBoxFlag xmlns:ma14="http://schemas.microsoft.com/office/mac/drawingml/2011/main" val="1"/>
+            </a:ext>
+          </a:extLst>
+        </p:spPr>
+        <p:txBody>
+          <a:bodyPr wrap="none" lIns="50800" tIns="50800" rIns="50800" bIns="50800" anchor="ctr">
+            <a:spAutoFit/>
+          </a:bodyPr>
+          <a:lstStyle>
+            <a:lvl1pPr>
+              <a:defRPr sz="5000"/>
+            </a:lvl1pPr>
+          </a:lstStyle>
+          <a:p>
+            <a:pPr/>
+            <a:r>
+              <a:t>Language? French, English, bilingual?</a:t>
+            </a:r>
+          </a:p>
+        </p:txBody>
+      </p:sp>
+      <p:sp>
+        <p:nvSpPr>
+          <p:cNvPr id="207" name="Shape 207"/>
+          <p:cNvSpPr/>
+          <p:nvPr/>
+        </p:nvSpPr>
+        <p:spPr>
+          <a:xfrm>
+            <a:off x="2731452" y="3698173"/>
+            <a:ext cx="7795896" cy="863601"/>
+          </a:xfrm>
+          <a:prstGeom prst="rect">
+            <a:avLst/>
+          </a:prstGeom>
+          <a:ln w="12700">
+            <a:miter lim="400000"/>
+          </a:ln>
+          <a:extLst>
+            <a:ext uri="{C572A759-6A51-4108-AA02-DFA0A04FC94B}">
+              <ma14:wrappingTextBoxFlag xmlns:ma14="http://schemas.microsoft.com/office/mac/drawingml/2011/main" val="1"/>
+            </a:ext>
+          </a:extLst>
+        </p:spPr>
+        <p:txBody>
+          <a:bodyPr wrap="none" lIns="50800" tIns="50800" rIns="50800" bIns="50800" anchor="ctr">
+            <a:spAutoFit/>
+          </a:bodyPr>
+          <a:lstStyle>
+            <a:lvl1pPr>
+              <a:defRPr sz="5000"/>
+            </a:lvl1pPr>
+          </a:lstStyle>
+          <a:p>
+            <a:pPr/>
+            <a:r>
+              <a:t>Meeting frequency / times?</a:t>
+            </a:r>
+          </a:p>
+        </p:txBody>
+      </p:sp>
+      <p:sp>
+        <p:nvSpPr>
+          <p:cNvPr id="208" name="Shape 208"/>
+          <p:cNvSpPr/>
+          <p:nvPr/>
+        </p:nvSpPr>
+        <p:spPr>
+          <a:xfrm>
+            <a:off x="5689917" y="6779991"/>
+            <a:ext cx="1878966" cy="863601"/>
+          </a:xfrm>
+          <a:prstGeom prst="rect">
+            <a:avLst/>
+          </a:prstGeom>
+          <a:ln w="12700">
+            <a:miter lim="400000"/>
+          </a:ln>
+          <a:extLst>
+            <a:ext uri="{C572A759-6A51-4108-AA02-DFA0A04FC94B}">
+              <ma14:wrappingTextBoxFlag xmlns:ma14="http://schemas.microsoft.com/office/mac/drawingml/2011/main" val="1"/>
+            </a:ext>
+          </a:extLst>
+        </p:spPr>
+        <p:txBody>
+          <a:bodyPr wrap="none" lIns="50800" tIns="50800" rIns="50800" bIns="50800" anchor="ctr">
+            <a:spAutoFit/>
+          </a:bodyPr>
+          <a:lstStyle>
+            <a:lvl1pPr>
+              <a:defRPr sz="5000"/>
+            </a:lvl1pPr>
+          </a:lstStyle>
+          <a:p>
+            <a:pPr/>
+            <a:r>
+              <a:t>Logo?</a:t>
+            </a:r>
+          </a:p>
+        </p:txBody>
+      </p:sp>
+      <p:pic>
+        <p:nvPicPr>
+          <p:cNvPr id="209" name="Rladies2.png"/>
+          <p:cNvPicPr>
+            <a:picLocks noChangeAspect="1"/>
+          </p:cNvPicPr>
+          <p:nvPr/>
+        </p:nvPicPr>
+        <p:blipFill>
+          <a:blip r:embed="rId3">
+            <a:extLst/>
+          </a:blip>
+          <a:stretch>
+            <a:fillRect/>
+          </a:stretch>
+        </p:blipFill>
+        <p:spPr>
+          <a:xfrm>
+            <a:off x="7569954" y="7172717"/>
+            <a:ext cx="3066161" cy="1974255"/>
+          </a:xfrm>
+          <a:prstGeom prst="rect">
+            <a:avLst/>
+          </a:prstGeom>
+          <a:ln w="12700">
+            <a:miter lim="400000"/>
+          </a:ln>
+        </p:spPr>
+      </p:pic>
+      <p:pic>
+        <p:nvPicPr>
+          <p:cNvPr id="210" name="pasted-image.pdf"/>
+          <p:cNvPicPr>
+            <a:picLocks noChangeAspect="1"/>
+          </p:cNvPicPr>
+          <p:nvPr/>
+        </p:nvPicPr>
+        <p:blipFill>
+          <a:blip r:embed="rId4">
+            <a:extLst/>
+          </a:blip>
+          <a:stretch>
+            <a:fillRect/>
+          </a:stretch>
+        </p:blipFill>
+        <p:spPr>
+          <a:xfrm>
+            <a:off x="3219065" y="7141667"/>
+            <a:ext cx="2314952" cy="2540001"/>
+          </a:xfrm>
+          <a:prstGeom prst="rect">
+            <a:avLst/>
+          </a:prstGeom>
+          <a:ln w="12700">
+            <a:miter lim="400000"/>
+          </a:ln>
+        </p:spPr>
+      </p:pic>
+      <p:sp>
+        <p:nvSpPr>
+          <p:cNvPr id="211" name="Shape 211"/>
+          <p:cNvSpPr/>
+          <p:nvPr/>
+        </p:nvSpPr>
+        <p:spPr>
+          <a:xfrm>
+            <a:off x="2073274" y="5282615"/>
+            <a:ext cx="9112251" cy="863601"/>
+          </a:xfrm>
+          <a:prstGeom prst="rect">
+            <a:avLst/>
+          </a:prstGeom>
+          <a:ln w="12700">
+            <a:miter lim="400000"/>
+          </a:ln>
+          <a:extLst>
+            <a:ext uri="{C572A759-6A51-4108-AA02-DFA0A04FC94B}">
+              <ma14:wrappingTextBoxFlag xmlns:ma14="http://schemas.microsoft.com/office/mac/drawingml/2011/main" val="1"/>
+            </a:ext>
+          </a:extLst>
+        </p:spPr>
+        <p:txBody>
+          <a:bodyPr wrap="none" lIns="50800" tIns="50800" rIns="50800" bIns="50800" anchor="ctr">
+            <a:spAutoFit/>
+          </a:bodyPr>
+          <a:lstStyle>
+            <a:lvl1pPr>
+              <a:defRPr sz="5000"/>
+            </a:lvl1pPr>
+          </a:lstStyle>
+          <a:p>
+            <a:pPr/>
+            <a:r>
+              <a:t>Speakers? (you or suggestions)</a:t>
+            </a:r>
+          </a:p>
+        </p:txBody>
+      </p:sp>
+    </p:spTree>
+  </p:cSld>
+  <p:clrMapOvr>
+    <a:masterClrMapping/>
+  </p:clrMapOvr>
+  <p:transition xmlns:p14="http://schemas.microsoft.com/office/powerpoint/2010/main" spd="med" advClick="1" p14:dur="1000"/>
+  <p:timing>
+    <p:tnLst>
+      <p:par>
+        <p:cTn id="1" nodeType="tmRoot" restart="never" dur="indefinite" fill="hold">
+          <p:childTnLst>
+            <p:seq concurrent="1" prevAc="none" nextAc="seek">
+              <p:cTn id="2" nodeType="mainSeq" dur="indefinite" fill="hold">
+                <p:childTnLst>
+                  <p:par>
+                    <p:cTn id="3" fill="hold">
+                      <p:stCondLst>
+                        <p:cond delay="indefinite"/>
+                      </p:stCondLst>
+                      <p:childTnLst>
+                        <p:par>
+                          <p:cTn id="4" fill="hold">
+                            <p:stCondLst>
+                              <p:cond delay="0"/>
+                            </p:stCondLst>
+                            <p:childTnLst>
+                              <p:par>
+                                <p:cTn id="5" presetClass="entr" nodeType="clickEffect" presetSubtype="0" presetID="1" grpId="1" fill="hold">
+                                  <p:stCondLst>
+                                    <p:cond delay="0"/>
+                                  </p:stCondLst>
+                                  <p:iterate type="el" backwards="0">
+                                    <p:tmAbs val="0"/>
+                                  </p:iterate>
+                                  <p:childTnLst>
+                                    <p:set>
+                                      <p:cBhvr>
+                                        <p:cTn id="6" fill="hold"/>
+                                        <p:tgtEl>
+                                          <p:spTgt spid="206"/>
+                                        </p:tgtEl>
+                                        <p:attrNameLst>
+                                          <p:attrName>style.visibility</p:attrName>
+                                        </p:attrNameLst>
+                                      </p:cBhvr>
+                                      <p:to>
+                                        <p:strVal val="visible"/>
+                                      </p:to>
+                                    </p:set>
+                                  </p:childTnLst>
+                                </p:cTn>
+                              </p:par>
+                            </p:childTnLst>
+                          </p:cTn>
+                        </p:par>
+                      </p:childTnLst>
+                    </p:cTn>
+                  </p:par>
+                  <p:par>
+                    <p:cTn id="7" fill="hold">
+                      <p:stCondLst>
+                        <p:cond delay="indefinite"/>
+                      </p:stCondLst>
+                      <p:childTnLst>
+                        <p:par>
+                          <p:cTn id="8" fill="hold">
+                            <p:stCondLst>
+                              <p:cond delay="0"/>
+                            </p:stCondLst>
+                            <p:childTnLst>
+                              <p:par>
+                                <p:cTn id="9" presetClass="entr" nodeType="clickEffect" presetSubtype="0" presetID="1" grpId="2" fill="hold">
+                                  <p:stCondLst>
+                                    <p:cond delay="0"/>
+                                  </p:stCondLst>
+                                  <p:iterate type="el" backwards="0">
+                                    <p:tmAbs val="0"/>
+                                  </p:iterate>
+                                  <p:childTnLst>
+                                    <p:set>
+                                      <p:cBhvr>
+                                        <p:cTn id="10" fill="hold"/>
+                                        <p:tgtEl>
+                                          <p:spTgt spid="207"/>
+                                        </p:tgtEl>
+                                        <p:attrNameLst>
+                                          <p:attrName>style.visibility</p:attrName>
+                                        </p:attrNameLst>
+                                      </p:cBhvr>
+                                      <p:to>
+                                        <p:strVal val="visible"/>
+                                      </p:to>
+                                    </p:set>
+                                  </p:childTnLst>
+                                </p:cTn>
+                              </p:par>
+                            </p:childTnLst>
+                          </p:cTn>
+                        </p:par>
+                      </p:childTnLst>
+                    </p:cTn>
+                  </p:par>
+                  <p:par>
+                    <p:cTn id="11" fill="hold">
+                      <p:stCondLst>
+                        <p:cond delay="indefinite"/>
+                      </p:stCondLst>
+                      <p:childTnLst>
+                        <p:par>
+                          <p:cTn id="12" fill="hold">
+                            <p:stCondLst>
+                              <p:cond delay="0"/>
+                            </p:stCondLst>
+                            <p:childTnLst>
+                              <p:par>
+                                <p:cTn id="13" presetClass="entr" nodeType="clickEffect" presetSubtype="0" presetID="1" grpId="3" fill="hold">
+                                  <p:stCondLst>
+                                    <p:cond delay="0"/>
+                                  </p:stCondLst>
+                                  <p:iterate type="el" backwards="0">
+                                    <p:tmAbs val="0"/>
+                                  </p:iterate>
+                                  <p:childTnLst>
+                                    <p:set>
+                                      <p:cBhvr>
+                                        <p:cTn id="14" fill="hold"/>
+                                        <p:tgtEl>
+                                          <p:spTgt spid="211"/>
+                                        </p:tgtEl>
+                                        <p:attrNameLst>
+                                          <p:attrName>style.visibility</p:attrName>
+                                        </p:attrNameLst>
+                                      </p:cBhvr>
+                                      <p:to>
+                                        <p:strVal val="visible"/>
+                                      </p:to>
+                                    </p:set>
+                                  </p:childTnLst>
+                                </p:cTn>
+                              </p:par>
+                            </p:childTnLst>
+                          </p:cTn>
+                        </p:par>
+                      </p:childTnLst>
+                    </p:cTn>
+                  </p:par>
+                  <p:par>
+                    <p:cTn id="15" fill="hold">
+                      <p:stCondLst>
+                        <p:cond delay="indefinite"/>
+                      </p:stCondLst>
+                      <p:childTnLst>
+                        <p:par>
+                          <p:cTn id="16" fill="hold">
+                            <p:stCondLst>
+                              <p:cond delay="0"/>
+                            </p:stCondLst>
+                            <p:childTnLst>
+                              <p:par>
+                                <p:cTn id="17" presetClass="entr" nodeType="clickEffect" presetSubtype="0" presetID="1" grpId="4" fill="hold">
+                                  <p:stCondLst>
+                                    <p:cond delay="0"/>
+                                  </p:stCondLst>
+                                  <p:iterate type="el" backwards="0">
+                                    <p:tmAbs val="0"/>
+                                  </p:iterate>
+                                  <p:childTnLst>
+                                    <p:set>
+                                      <p:cBhvr>
+                                        <p:cTn id="18" fill="hold"/>
+                                        <p:tgtEl>
+                                          <p:spTgt spid="210"/>
+                                        </p:tgtEl>
+                                        <p:attrNameLst>
+                                          <p:attrName>style.visibility</p:attrName>
+                                        </p:attrNameLst>
+                                      </p:cBhvr>
+                                      <p:to>
+                                        <p:strVal val="visible"/>
+                                      </p:to>
+                                    </p:set>
+                                  </p:childTnLst>
+                                </p:cTn>
+                              </p:par>
+                            </p:childTnLst>
+                          </p:cTn>
+                        </p:par>
+                        <p:par>
+                          <p:cTn id="19" fill="hold">
+                            <p:stCondLst>
+                              <p:cond delay="0"/>
+                            </p:stCondLst>
+                            <p:childTnLst>
+                              <p:par>
+                                <p:cTn id="20" presetClass="entr" nodeType="afterEffect" presetSubtype="0" presetID="1" grpId="5" fill="hold">
+                                  <p:stCondLst>
+                                    <p:cond delay="0"/>
+                                  </p:stCondLst>
+                                  <p:iterate type="el" backwards="0">
+                                    <p:tmAbs val="0"/>
+                                  </p:iterate>
+                                  <p:childTnLst>
+                                    <p:set>
+                                      <p:cBhvr>
+                                        <p:cTn id="21" fill="hold"/>
+                                        <p:tgtEl>
+                                          <p:spTgt spid="209"/>
+                                        </p:tgtEl>
+                                        <p:attrNameLst>
+                                          <p:attrName>style.visibility</p:attrName>
+                                        </p:attrNameLst>
+                                      </p:cBhvr>
+                                      <p:to>
+                                        <p:strVal val="visible"/>
+                                      </p:to>
+                                    </p:set>
+                                  </p:childTnLst>
+                                </p:cTn>
+                              </p:par>
+                            </p:childTnLst>
+                          </p:cTn>
+                        </p:par>
+                        <p:par>
+                          <p:cTn id="22" fill="hold">
+                            <p:stCondLst>
+                              <p:cond delay="0"/>
+                            </p:stCondLst>
+                            <p:childTnLst>
+                              <p:par>
+                                <p:cTn id="23" presetClass="entr" nodeType="afterEffect" presetSubtype="0" presetID="1" grpId="6" fill="hold">
+                                  <p:stCondLst>
+                                    <p:cond delay="0"/>
+                                  </p:stCondLst>
+                                  <p:iterate type="el" backwards="0">
+                                    <p:tmAbs val="0"/>
+                                  </p:iterate>
+                                  <p:childTnLst>
+                                    <p:set>
+                                      <p:cBhvr>
+                                        <p:cTn id="24" fill="hold"/>
+                                        <p:tgtEl>
+                                          <p:spTgt spid="208"/>
+                                        </p:tgtEl>
+                                        <p:attrNameLst>
+                                          <p:attrName>style.visibility</p:attrName>
+                                        </p:attrNameLst>
+                                      </p:cBhvr>
+                                      <p:to>
+                                        <p:strVal val="visible"/>
+                                      </p:to>
+                                    </p:set>
+                                  </p:childTnLst>
+                                </p:cTn>
+                              </p:par>
+                            </p:childTnLst>
+                          </p:cTn>
+                        </p:par>
+                      </p:childTnLst>
+                    </p:cTn>
+                  </p:par>
+                </p:childTnLst>
+              </p:cTn>
+              <p:prevCondLst>
+                <p:cond evt="onPrev">
+                  <p:tgtEl>
+                    <p:sldTgt/>
+                  </p:tgtEl>
+                </p:cond>
+              </p:prevCondLst>
+              <p:nextCondLst>
+                <p:cond evt="onNext">
+                  <p:tgtEl>
+                    <p:sldTgt/>
+                  </p:tgtEl>
+                </p:cond>
+              </p:nextCondLst>
+            </p:seq>
+          </p:childTnLst>
+        </p:cTn>
+      </p:par>
+    </p:tnLst>
+    <p:bldLst>
+      <p:bldP build="whole" bldLvl="1" animBg="1" rev="0" advAuto="0" spid="209" grpId="5"/>
+      <p:bldP build="whole" bldLvl="1" animBg="1" rev="0" advAuto="0" spid="208" grpId="6"/>
+      <p:bldP build="whole" bldLvl="1" animBg="1" rev="0" advAuto="0" spid="211" grpId="3"/>
+      <p:bldP build="whole" bldLvl="1" animBg="1" rev="0" advAuto="0" spid="207" grpId="2"/>
+      <p:bldP build="whole" bldLvl="1" animBg="1" rev="0" advAuto="0" spid="210" grpId="4"/>
+      <p:bldP build="whole" bldLvl="1" animBg="1" rev="0" advAuto="0" spid="206" grpId="1"/>
+    </p:bldLst>
+  </p:timing>
 </p:sld>
 </file>
 
@@ -3486,7 +4219,7 @@
       </p:grpSpPr>
       <p:sp>
         <p:nvSpPr>
-          <p:cNvPr id="126" name="Shape 126"/>
+          <p:cNvPr id="128" name="Shape 128"/>
           <p:cNvSpPr/>
           <p:nvPr/>
         </p:nvSpPr>
@@ -3526,7 +4259,7 @@
       </p:sp>
       <p:pic>
         <p:nvPicPr>
-          <p:cNvPr id="127" name="debate-interruptions1.png"/>
+          <p:cNvPr id="129" name="debate-interruptions1.png"/>
           <p:cNvPicPr>
             <a:picLocks noChangeAspect="1"/>
           </p:cNvPicPr>
@@ -3555,7 +4288,7 @@
       </p:pic>
       <p:pic>
         <p:nvPicPr>
-          <p:cNvPr id="128" name="Artboard 1-1.png"/>
+          <p:cNvPr id="130" name="Artboard 1-1.png"/>
           <p:cNvPicPr>
             <a:picLocks noChangeAspect="1"/>
           </p:cNvPicPr>
@@ -3621,7 +4354,7 @@
                                       <p:cBhvr>
                                         <p:cTn id="6" fill="hold"/>
                                         <p:tgtEl>
-                                          <p:spTgt spid="127"/>
+                                          <p:spTgt spid="129"/>
                                         </p:tgtEl>
                                         <p:attrNameLst>
                                           <p:attrName>style.visibility</p:attrName>
@@ -3665,7 +4398,7 @@
                                       <p:cBhvr>
                                         <p:cTn id="10" fill="hold"/>
                                         <p:tgtEl>
-                                          <p:spTgt spid="128"/>
+                                          <p:spTgt spid="130"/>
                                         </p:tgtEl>
                                         <p:attrNameLst>
                                           <p:attrName>style.visibility</p:attrName>
@@ -3706,8 +4439,8 @@
       </p:par>
     </p:tnLst>
     <p:bldLst>
-      <p:bldP build="whole" bldLvl="1" animBg="1" rev="0" advAuto="0" spid="128" grpId="2"/>
-      <p:bldP build="whole" bldLvl="1" animBg="1" rev="0" advAuto="0" spid="127" grpId="1"/>
+      <p:bldP build="whole" bldLvl="1" animBg="1" rev="0" advAuto="0" spid="129" grpId="1"/>
+      <p:bldP build="whole" bldLvl="1" animBg="1" rev="0" advAuto="0" spid="130" grpId="2"/>
     </p:bldLst>
   </p:timing>
 </p:sld>
@@ -3732,7 +4465,7 @@
       </p:grpSpPr>
       <p:grpSp>
         <p:nvGrpSpPr>
-          <p:cNvPr id="134" name="Group 134"/>
+          <p:cNvPr id="136" name="Group 136"/>
           <p:cNvGrpSpPr/>
           <p:nvPr/>
         </p:nvGrpSpPr>
@@ -3746,7 +4479,7 @@
         </p:grpSpPr>
         <p:pic>
           <p:nvPicPr>
-            <p:cNvPr id="132" name="diane_beldame.jpg"/>
+            <p:cNvPr id="134" name="diane_beldame.jpg"/>
             <p:cNvPicPr>
               <a:picLocks noChangeAspect="1"/>
             </p:cNvPicPr>
@@ -3777,7 +4510,7 @@
         </p:pic>
         <p:sp>
           <p:nvSpPr>
-            <p:cNvPr id="133" name="Shape 133"/>
+            <p:cNvPr id="135" name="Shape 135"/>
             <p:cNvSpPr/>
             <p:nvPr/>
           </p:nvSpPr>
@@ -3826,7 +4559,7 @@
       </p:grpSp>
       <p:grpSp>
         <p:nvGrpSpPr>
-          <p:cNvPr id="137" name="Group 137"/>
+          <p:cNvPr id="139" name="Group 139"/>
           <p:cNvGrpSpPr/>
           <p:nvPr/>
         </p:nvGrpSpPr>
@@ -3840,7 +4573,7 @@
         </p:grpSpPr>
         <p:pic>
           <p:nvPicPr>
-            <p:cNvPr id="135" name="christina_bergmann.jpg"/>
+            <p:cNvPr id="137" name="christina_bergmann.jpg"/>
             <p:cNvPicPr>
               <a:picLocks noChangeAspect="1"/>
             </p:cNvPicPr>
@@ -3871,7 +4604,7 @@
         </p:pic>
         <p:sp>
           <p:nvSpPr>
-            <p:cNvPr id="136" name="Shape 136"/>
+            <p:cNvPr id="138" name="Shape 138"/>
             <p:cNvSpPr/>
             <p:nvPr/>
           </p:nvSpPr>
@@ -3920,7 +4653,7 @@
       </p:grpSp>
       <p:grpSp>
         <p:nvGrpSpPr>
-          <p:cNvPr id="140" name="Group 140"/>
+          <p:cNvPr id="142" name="Group 142"/>
           <p:cNvGrpSpPr/>
           <p:nvPr/>
         </p:nvGrpSpPr>
@@ -3934,7 +4667,7 @@
         </p:grpSpPr>
         <p:pic>
           <p:nvPicPr>
-            <p:cNvPr id="138" name="page_piccinini.png"/>
+            <p:cNvPr id="140" name="page_piccinini.png"/>
             <p:cNvPicPr>
               <a:picLocks noChangeAspect="1"/>
             </p:cNvPicPr>
@@ -3965,7 +4698,7 @@
         </p:pic>
         <p:sp>
           <p:nvSpPr>
-            <p:cNvPr id="139" name="Shape 139"/>
+            <p:cNvPr id="141" name="Shape 141"/>
             <p:cNvSpPr/>
             <p:nvPr/>
           </p:nvSpPr>
@@ -4014,7 +4747,7 @@
       </p:grpSp>
       <p:sp>
         <p:nvSpPr>
-          <p:cNvPr id="141" name="Shape 141"/>
+          <p:cNvPr id="143" name="Shape 143"/>
           <p:cNvSpPr/>
           <p:nvPr/>
         </p:nvSpPr>
@@ -4091,7 +4824,7 @@
                                       <p:cBhvr>
                                         <p:cTn id="6" fill="hold"/>
                                         <p:tgtEl>
-                                          <p:spTgt spid="134"/>
+                                          <p:spTgt spid="136"/>
                                         </p:tgtEl>
                                         <p:attrNameLst>
                                           <p:attrName>style.visibility</p:attrName>
@@ -4126,7 +4859,7 @@
                                       <p:cBhvr>
                                         <p:cTn id="9" fill="hold"/>
                                         <p:tgtEl>
-                                          <p:spTgt spid="137"/>
+                                          <p:spTgt spid="139"/>
                                         </p:tgtEl>
                                         <p:attrNameLst>
                                           <p:attrName>style.visibility</p:attrName>
@@ -4161,7 +4894,7 @@
                                       <p:cBhvr>
                                         <p:cTn id="12" fill="hold"/>
                                         <p:tgtEl>
-                                          <p:spTgt spid="140"/>
+                                          <p:spTgt spid="142"/>
                                         </p:tgtEl>
                                         <p:attrNameLst>
                                           <p:attrName>style.visibility</p:attrName>
@@ -4202,9 +4935,9 @@
       </p:par>
     </p:tnLst>
     <p:bldLst>
-      <p:bldP build="whole" bldLvl="1" animBg="1" rev="0" advAuto="0" spid="137" grpId="2"/>
-      <p:bldP build="whole" bldLvl="1" animBg="1" rev="0" advAuto="0" spid="134" grpId="1"/>
-      <p:bldP build="whole" bldLvl="1" animBg="1" rev="0" advAuto="0" spid="140" grpId="3"/>
+      <p:bldP build="whole" bldLvl="1" animBg="1" rev="0" advAuto="0" spid="139" grpId="2"/>
+      <p:bldP build="whole" bldLvl="1" animBg="1" rev="0" advAuto="0" spid="142" grpId="3"/>
+      <p:bldP build="whole" bldLvl="1" animBg="1" rev="0" advAuto="0" spid="136" grpId="1"/>
     </p:bldLst>
   </p:timing>
 </p:sld>
@@ -4229,7 +4962,7 @@
       </p:grpSpPr>
       <p:sp>
         <p:nvSpPr>
-          <p:cNvPr id="143" name="Shape 143"/>
+          <p:cNvPr id="145" name="Shape 145"/>
           <p:cNvSpPr/>
           <p:nvPr/>
         </p:nvSpPr>
@@ -4275,7 +5008,7 @@
       </p:sp>
       <p:grpSp>
         <p:nvGrpSpPr>
-          <p:cNvPr id="146" name="Group 146"/>
+          <p:cNvPr id="148" name="Group 148"/>
           <p:cNvGrpSpPr/>
           <p:nvPr/>
         </p:nvGrpSpPr>
@@ -4289,7 +5022,7 @@
         </p:grpSpPr>
         <p:sp>
           <p:nvSpPr>
-            <p:cNvPr id="144" name="Shape 144"/>
+            <p:cNvPr id="146" name="Shape 146"/>
             <p:cNvSpPr/>
             <p:nvPr/>
           </p:nvSpPr>
@@ -4330,14 +5063,14 @@
             <a:p>
               <a:pPr/>
               <a:r>
-                <a:t>27</a:t>
+                <a:t>33</a:t>
               </a:r>
             </a:p>
           </p:txBody>
         </p:sp>
         <p:pic>
           <p:nvPicPr>
-            <p:cNvPr id="145" name="person.jpg"/>
+            <p:cNvPr id="147" name="person.jpg"/>
             <p:cNvPicPr>
               <a:picLocks noChangeAspect="1"/>
             </p:cNvPicPr>
@@ -4369,7 +5102,7 @@
       </p:grpSp>
       <p:grpSp>
         <p:nvGrpSpPr>
-          <p:cNvPr id="149" name="Group 149"/>
+          <p:cNvPr id="151" name="Group 151"/>
           <p:cNvGrpSpPr/>
           <p:nvPr/>
         </p:nvGrpSpPr>
@@ -4383,7 +5116,7 @@
         </p:grpSpPr>
         <p:pic>
           <p:nvPicPr>
-            <p:cNvPr id="147" name="person.jpg"/>
+            <p:cNvPr id="149" name="person.jpg"/>
             <p:cNvPicPr>
               <a:picLocks noChangeAspect="1"/>
             </p:cNvPicPr>
@@ -4414,7 +5147,7 @@
         </p:pic>
         <p:sp>
           <p:nvSpPr>
-            <p:cNvPr id="148" name="Shape 148"/>
+            <p:cNvPr id="150" name="Shape 150"/>
             <p:cNvSpPr/>
             <p:nvPr/>
           </p:nvSpPr>
@@ -4485,7 +5218,7 @@
                 </a:defRPr>
               </a:pPr>
               <a:r>
-                <a:t>(1)</a:t>
+                <a:t>(3)</a:t>
               </a:r>
             </a:p>
           </p:txBody>
@@ -4493,7 +5226,7 @@
       </p:grpSp>
       <p:grpSp>
         <p:nvGrpSpPr>
-          <p:cNvPr id="152" name="Group 152"/>
+          <p:cNvPr id="154" name="Group 154"/>
           <p:cNvGrpSpPr/>
           <p:nvPr/>
         </p:nvGrpSpPr>
@@ -4507,7 +5240,7 @@
         </p:grpSpPr>
         <p:pic>
           <p:nvPicPr>
-            <p:cNvPr id="150" name="person.jpg"/>
+            <p:cNvPr id="152" name="person.jpg"/>
             <p:cNvPicPr>
               <a:picLocks noChangeAspect="1"/>
             </p:cNvPicPr>
@@ -4538,7 +5271,7 @@
         </p:pic>
         <p:sp>
           <p:nvSpPr>
-            <p:cNvPr id="151" name="Shape 151"/>
+            <p:cNvPr id="153" name="Shape 153"/>
             <p:cNvSpPr/>
             <p:nvPr/>
           </p:nvSpPr>
@@ -4620,7 +5353,7 @@
       </p:grpSp>
       <p:grpSp>
         <p:nvGrpSpPr>
-          <p:cNvPr id="155" name="Group 155"/>
+          <p:cNvPr id="157" name="Group 157"/>
           <p:cNvGrpSpPr/>
           <p:nvPr/>
         </p:nvGrpSpPr>
@@ -4634,7 +5367,7 @@
         </p:grpSpPr>
         <p:sp>
           <p:nvSpPr>
-            <p:cNvPr id="153" name="Shape 153"/>
+            <p:cNvPr id="155" name="Shape 155"/>
             <p:cNvSpPr/>
             <p:nvPr/>
           </p:nvSpPr>
@@ -4712,7 +5445,7 @@
         </p:sp>
         <p:pic>
           <p:nvPicPr>
-            <p:cNvPr id="154" name="person.jpg"/>
+            <p:cNvPr id="156" name="person.jpg"/>
             <p:cNvPicPr>
               <a:picLocks noChangeAspect="1"/>
             </p:cNvPicPr>
@@ -4744,7 +5477,7 @@
       </p:grpSp>
       <p:grpSp>
         <p:nvGrpSpPr>
-          <p:cNvPr id="158" name="Group 158"/>
+          <p:cNvPr id="160" name="Group 160"/>
           <p:cNvGrpSpPr/>
           <p:nvPr/>
         </p:nvGrpSpPr>
@@ -4758,7 +5491,7 @@
         </p:grpSpPr>
         <p:sp>
           <p:nvSpPr>
-            <p:cNvPr id="156" name="Shape 156"/>
+            <p:cNvPr id="158" name="Shape 158"/>
             <p:cNvSpPr/>
             <p:nvPr/>
           </p:nvSpPr>
@@ -4832,14 +5565,14 @@
                 </a:defRPr>
               </a:pPr>
               <a:r>
-                <a:t>(4)</a:t>
+                <a:t>(7)</a:t>
               </a:r>
             </a:p>
           </p:txBody>
         </p:sp>
         <p:pic>
           <p:nvPicPr>
-            <p:cNvPr id="157" name="person.jpg"/>
+            <p:cNvPr id="159" name="person.jpg"/>
             <p:cNvPicPr>
               <a:picLocks noChangeAspect="1"/>
             </p:cNvPicPr>
@@ -4871,7 +5604,7 @@
       </p:grpSp>
       <p:grpSp>
         <p:nvGrpSpPr>
-          <p:cNvPr id="161" name="Group 161"/>
+          <p:cNvPr id="163" name="Group 163"/>
           <p:cNvGrpSpPr/>
           <p:nvPr/>
         </p:nvGrpSpPr>
@@ -4885,7 +5618,7 @@
         </p:grpSpPr>
         <p:sp>
           <p:nvSpPr>
-            <p:cNvPr id="159" name="Shape 159"/>
+            <p:cNvPr id="161" name="Shape 161"/>
             <p:cNvSpPr/>
             <p:nvPr/>
           </p:nvSpPr>
@@ -4956,14 +5689,14 @@
                 </a:defRPr>
               </a:pPr>
               <a:r>
-                <a:t>(9)</a:t>
+                <a:t>(10)</a:t>
               </a:r>
             </a:p>
           </p:txBody>
         </p:sp>
         <p:pic>
           <p:nvPicPr>
-            <p:cNvPr id="160" name="person.jpg"/>
+            <p:cNvPr id="162" name="person.jpg"/>
             <p:cNvPicPr>
               <a:picLocks noChangeAspect="1"/>
             </p:cNvPicPr>
@@ -4995,7 +5728,7 @@
       </p:grpSp>
       <p:sp>
         <p:nvSpPr>
-          <p:cNvPr id="162" name="Shape 162"/>
+          <p:cNvPr id="164" name="Shape 164"/>
           <p:cNvSpPr/>
           <p:nvPr/>
         </p:nvSpPr>
@@ -5064,7 +5797,7 @@
                                       <p:cBhvr>
                                         <p:cTn id="6" fill="hold"/>
                                         <p:tgtEl>
-                                          <p:spTgt spid="146"/>
+                                          <p:spTgt spid="148"/>
                                         </p:tgtEl>
                                         <p:attrNameLst>
                                           <p:attrName>style.visibility</p:attrName>
@@ -5108,7 +5841,7 @@
                                       <p:cBhvr>
                                         <p:cTn id="10" fill="hold"/>
                                         <p:tgtEl>
-                                          <p:spTgt spid="162"/>
+                                          <p:spTgt spid="164"/>
                                         </p:tgtEl>
                                         <p:attrNameLst>
                                           <p:attrName>style.visibility</p:attrName>
@@ -5143,7 +5876,7 @@
                                       <p:cBhvr>
                                         <p:cTn id="13" fill="hold"/>
                                         <p:tgtEl>
-                                          <p:spTgt spid="149"/>
+                                          <p:spTgt spid="151"/>
                                         </p:tgtEl>
                                         <p:attrNameLst>
                                           <p:attrName>style.visibility</p:attrName>
@@ -5187,7 +5920,7 @@
                                       <p:cBhvr>
                                         <p:cTn id="17" fill="hold"/>
                                         <p:tgtEl>
-                                          <p:spTgt spid="152"/>
+                                          <p:spTgt spid="154"/>
                                         </p:tgtEl>
                                         <p:attrNameLst>
                                           <p:attrName>style.visibility</p:attrName>
@@ -5231,7 +5964,7 @@
                                       <p:cBhvr>
                                         <p:cTn id="21" fill="hold"/>
                                         <p:tgtEl>
-                                          <p:spTgt spid="155"/>
+                                          <p:spTgt spid="157"/>
                                         </p:tgtEl>
                                         <p:attrNameLst>
                                           <p:attrName>style.visibility</p:attrName>
@@ -5275,7 +6008,7 @@
                                       <p:cBhvr>
                                         <p:cTn id="25" fill="hold"/>
                                         <p:tgtEl>
-                                          <p:spTgt spid="158"/>
+                                          <p:spTgt spid="160"/>
                                         </p:tgtEl>
                                         <p:attrNameLst>
                                           <p:attrName>style.visibility</p:attrName>
@@ -5319,7 +6052,7 @@
                                       <p:cBhvr>
                                         <p:cTn id="29" fill="hold"/>
                                         <p:tgtEl>
-                                          <p:spTgt spid="161"/>
+                                          <p:spTgt spid="163"/>
                                         </p:tgtEl>
                                         <p:attrNameLst>
                                           <p:attrName>style.visibility</p:attrName>
@@ -5360,13 +6093,13 @@
       </p:par>
     </p:tnLst>
     <p:bldLst>
-      <p:bldP build="whole" bldLvl="1" animBg="1" rev="0" advAuto="0" spid="162" grpId="2"/>
-      <p:bldP build="whole" bldLvl="1" animBg="1" rev="0" advAuto="0" spid="152" grpId="4"/>
-      <p:bldP build="whole" bldLvl="1" animBg="1" rev="0" advAuto="0" spid="146" grpId="1"/>
-      <p:bldP build="whole" bldLvl="1" animBg="1" rev="0" advAuto="0" spid="149" grpId="3"/>
-      <p:bldP build="whole" bldLvl="1" animBg="1" rev="0" advAuto="0" spid="158" grpId="6"/>
-      <p:bldP build="whole" bldLvl="1" animBg="1" rev="0" advAuto="0" spid="155" grpId="5"/>
-      <p:bldP build="whole" bldLvl="1" animBg="1" rev="0" advAuto="0" spid="161" grpId="7"/>
+      <p:bldP build="whole" bldLvl="1" animBg="1" rev="0" advAuto="0" spid="151" grpId="3"/>
+      <p:bldP build="whole" bldLvl="1" animBg="1" rev="0" advAuto="0" spid="163" grpId="7"/>
+      <p:bldP build="whole" bldLvl="1" animBg="1" rev="0" advAuto="0" spid="164" grpId="2"/>
+      <p:bldP build="whole" bldLvl="1" animBg="1" rev="0" advAuto="0" spid="154" grpId="4"/>
+      <p:bldP build="whole" bldLvl="1" animBg="1" rev="0" advAuto="0" spid="160" grpId="6"/>
+      <p:bldP build="whole" bldLvl="1" animBg="1" rev="0" advAuto="0" spid="157" grpId="5"/>
+      <p:bldP build="whole" bldLvl="1" animBg="1" rev="0" advAuto="0" spid="148" grpId="1"/>
     </p:bldLst>
   </p:timing>
 </p:sld>
@@ -5391,7 +6124,7 @@
       </p:grpSpPr>
       <p:sp>
         <p:nvSpPr>
-          <p:cNvPr id="164" name="Shape 164"/>
+          <p:cNvPr id="166" name="Shape 166"/>
           <p:cNvSpPr/>
           <p:nvPr/>
         </p:nvSpPr>
@@ -5437,7 +6170,7 @@
       </p:sp>
       <p:pic>
         <p:nvPicPr>
-          <p:cNvPr id="165" name="topic_pref.pdf"/>
+          <p:cNvPr id="167" name="topic_pref.pdf"/>
           <p:cNvPicPr>
             <a:picLocks noChangeAspect="1"/>
           </p:cNvPicPr>
@@ -5492,7 +6225,7 @@
       </p:grpSpPr>
       <p:sp>
         <p:nvSpPr>
-          <p:cNvPr id="167" name="Shape 167"/>
+          <p:cNvPr id="169" name="Shape 169"/>
           <p:cNvSpPr/>
           <p:nvPr/>
         </p:nvSpPr>
@@ -5538,7 +6271,7 @@
       </p:sp>
       <p:pic>
         <p:nvPicPr>
-          <p:cNvPr id="168" name="topic_pref.pdf"/>
+          <p:cNvPr id="170" name="topic_pref.pdf"/>
           <p:cNvPicPr>
             <a:picLocks noChangeAspect="1"/>
           </p:cNvPicPr>
@@ -5567,7 +6300,7 @@
       </p:pic>
       <p:sp>
         <p:nvSpPr>
-          <p:cNvPr id="169" name="Shape 169"/>
+          <p:cNvPr id="171" name="Shape 171"/>
           <p:cNvSpPr/>
           <p:nvPr/>
         </p:nvSpPr>
@@ -5598,7 +6331,7 @@
       </p:sp>
       <p:sp>
         <p:nvSpPr>
-          <p:cNvPr id="170" name="Shape 170"/>
+          <p:cNvPr id="172" name="Shape 172"/>
           <p:cNvSpPr/>
           <p:nvPr/>
         </p:nvSpPr>
@@ -5629,13 +6362,13 @@
       </p:sp>
       <p:sp>
         <p:nvSpPr>
-          <p:cNvPr id="171" name="Shape 171"/>
+          <p:cNvPr id="173" name="Shape 173"/>
           <p:cNvSpPr/>
           <p:nvPr/>
         </p:nvSpPr>
         <p:spPr>
           <a:xfrm>
-            <a:off x="4254479" y="3396221"/>
+            <a:off x="4254479" y="2914085"/>
             <a:ext cx="2830794" cy="271560"/>
           </a:xfrm>
           <a:prstGeom prst="rect">
@@ -5660,14 +6393,14 @@
       </p:sp>
       <p:sp>
         <p:nvSpPr>
-          <p:cNvPr id="172" name="Shape 172"/>
+          <p:cNvPr id="174" name="Shape 174"/>
           <p:cNvSpPr/>
           <p:nvPr/>
         </p:nvSpPr>
         <p:spPr>
           <a:xfrm>
-            <a:off x="7094781" y="2908774"/>
-            <a:ext cx="2830794" cy="271559"/>
+            <a:off x="4254479" y="3156674"/>
+            <a:ext cx="2830794" cy="271560"/>
           </a:xfrm>
           <a:prstGeom prst="rect">
             <a:avLst/>
@@ -5691,44 +6424,13 @@
       </p:sp>
       <p:sp>
         <p:nvSpPr>
-          <p:cNvPr id="173" name="Shape 173"/>
+          <p:cNvPr id="175" name="Shape 175"/>
           <p:cNvSpPr/>
           <p:nvPr/>
         </p:nvSpPr>
         <p:spPr>
           <a:xfrm>
-            <a:off x="7094781" y="3151363"/>
-            <a:ext cx="2830794" cy="271559"/>
-          </a:xfrm>
-          <a:prstGeom prst="rect">
-            <a:avLst/>
-          </a:prstGeom>
-          <a:ln w="25400">
-            <a:solidFill>
-              <a:srgbClr val="000000"/>
-            </a:solidFill>
-            <a:miter lim="400000"/>
-          </a:ln>
-        </p:spPr>
-        <p:txBody>
-          <a:bodyPr lIns="50800" tIns="50800" rIns="50800" bIns="50800" anchor="ctr"/>
-          <a:lstStyle/>
-          <a:p>
-            <a:pPr>
-              <a:defRPr sz="2400"/>
-            </a:pPr>
-          </a:p>
-        </p:txBody>
-      </p:sp>
-      <p:sp>
-        <p:nvSpPr>
-          <p:cNvPr id="174" name="Shape 174"/>
-          <p:cNvSpPr/>
-          <p:nvPr/>
-        </p:nvSpPr>
-        <p:spPr>
-          <a:xfrm>
-            <a:off x="6191326" y="5407460"/>
+            <a:off x="4688371" y="5407460"/>
             <a:ext cx="774548" cy="3709029"/>
           </a:xfrm>
           <a:prstGeom prst="rect">
@@ -5753,13 +6455,13 @@
       </p:sp>
       <p:sp>
         <p:nvSpPr>
-          <p:cNvPr id="175" name="Shape 175"/>
+          <p:cNvPr id="176" name="Shape 176"/>
           <p:cNvSpPr/>
           <p:nvPr/>
         </p:nvSpPr>
         <p:spPr>
           <a:xfrm>
-            <a:off x="7689544" y="5407460"/>
+            <a:off x="5429294" y="5407460"/>
             <a:ext cx="774548" cy="3709029"/>
           </a:xfrm>
           <a:prstGeom prst="rect">
@@ -5782,300 +6484,12 @@
           </a:p>
         </p:txBody>
       </p:sp>
-      <p:sp>
-        <p:nvSpPr>
-          <p:cNvPr id="176" name="Shape 176"/>
-          <p:cNvSpPr/>
-          <p:nvPr/>
-        </p:nvSpPr>
-        <p:spPr>
-          <a:xfrm>
-            <a:off x="8432664" y="5407460"/>
-            <a:ext cx="774548" cy="3709029"/>
-          </a:xfrm>
-          <a:prstGeom prst="rect">
-            <a:avLst/>
-          </a:prstGeom>
-          <a:ln w="50800">
-            <a:solidFill>
-              <a:srgbClr val="000000"/>
-            </a:solidFill>
-            <a:miter lim="400000"/>
-          </a:ln>
-        </p:spPr>
-        <p:txBody>
-          <a:bodyPr lIns="50800" tIns="50800" rIns="50800" bIns="50800" anchor="ctr"/>
-          <a:lstStyle/>
-          <a:p>
-            <a:pPr>
-              <a:defRPr sz="2400"/>
-            </a:pPr>
-          </a:p>
-        </p:txBody>
-      </p:sp>
     </p:spTree>
   </p:cSld>
   <p:clrMapOvr>
     <a:masterClrMapping/>
   </p:clrMapOvr>
   <p:transition xmlns:p14="http://schemas.microsoft.com/office/powerpoint/2010/main" spd="med" advClick="1" p14:dur="1000"/>
-  <p:timing>
-    <p:tnLst>
-      <p:par>
-        <p:cTn id="1" nodeType="tmRoot" restart="never" dur="indefinite" fill="hold">
-          <p:childTnLst>
-            <p:seq concurrent="1" prevAc="none" nextAc="seek">
-              <p:cTn id="2" nodeType="mainSeq" dur="indefinite" fill="hold">
-                <p:childTnLst>
-                  <p:par>
-                    <p:cTn id="3" fill="hold">
-                      <p:stCondLst>
-                        <p:cond delay="indefinite"/>
-                      </p:stCondLst>
-                      <p:childTnLst>
-                        <p:par>
-                          <p:cTn id="4" fill="hold">
-                            <p:stCondLst>
-                              <p:cond delay="0"/>
-                            </p:stCondLst>
-                            <p:childTnLst>
-                              <p:par>
-                                <p:cTn id="5" presetClass="entr" nodeType="clickEffect" presetSubtype="0" presetID="1" grpId="1" fill="hold">
-                                  <p:stCondLst>
-                                    <p:cond delay="0"/>
-                                  </p:stCondLst>
-                                  <p:iterate type="el" backwards="0">
-                                    <p:tmAbs val="0"/>
-                                  </p:iterate>
-                                  <p:childTnLst>
-                                    <p:set>
-                                      <p:cBhvr>
-                                        <p:cTn id="6" fill="hold"/>
-                                        <p:tgtEl>
-                                          <p:spTgt spid="172"/>
-                                        </p:tgtEl>
-                                        <p:attrNameLst>
-                                          <p:attrName>style.visibility</p:attrName>
-                                        </p:attrNameLst>
-                                      </p:cBhvr>
-                                      <p:to>
-                                        <p:strVal val="visible"/>
-                                      </p:to>
-                                    </p:set>
-                                  </p:childTnLst>
-                                </p:cTn>
-                              </p:par>
-                            </p:childTnLst>
-                          </p:cTn>
-                        </p:par>
-                        <p:par>
-                          <p:cTn id="7" fill="hold">
-                            <p:stCondLst>
-                              <p:cond delay="0"/>
-                            </p:stCondLst>
-                            <p:childTnLst>
-                              <p:par>
-                                <p:cTn id="8" presetClass="entr" nodeType="afterEffect" presetSubtype="0" presetID="1" grpId="2" fill="hold">
-                                  <p:stCondLst>
-                                    <p:cond delay="0"/>
-                                  </p:stCondLst>
-                                  <p:iterate type="el" backwards="0">
-                                    <p:tmAbs val="0"/>
-                                  </p:iterate>
-                                  <p:childTnLst>
-                                    <p:set>
-                                      <p:cBhvr>
-                                        <p:cTn id="9" fill="hold"/>
-                                        <p:tgtEl>
-                                          <p:spTgt spid="173"/>
-                                        </p:tgtEl>
-                                        <p:attrNameLst>
-                                          <p:attrName>style.visibility</p:attrName>
-                                        </p:attrNameLst>
-                                      </p:cBhvr>
-                                      <p:to>
-                                        <p:strVal val="visible"/>
-                                      </p:to>
-                                    </p:set>
-                                  </p:childTnLst>
-                                </p:cTn>
-                              </p:par>
-                            </p:childTnLst>
-                          </p:cTn>
-                        </p:par>
-                        <p:par>
-                          <p:cTn id="10" fill="hold">
-                            <p:stCondLst>
-                              <p:cond delay="0"/>
-                            </p:stCondLst>
-                            <p:childTnLst>
-                              <p:par>
-                                <p:cTn id="11" presetClass="entr" nodeType="afterEffect" presetSubtype="0" presetID="1" grpId="3" fill="hold">
-                                  <p:stCondLst>
-                                    <p:cond delay="0"/>
-                                  </p:stCondLst>
-                                  <p:iterate type="el" backwards="0">
-                                    <p:tmAbs val="0"/>
-                                  </p:iterate>
-                                  <p:childTnLst>
-                                    <p:set>
-                                      <p:cBhvr>
-                                        <p:cTn id="12" fill="hold"/>
-                                        <p:tgtEl>
-                                          <p:spTgt spid="171"/>
-                                        </p:tgtEl>
-                                        <p:attrNameLst>
-                                          <p:attrName>style.visibility</p:attrName>
-                                        </p:attrNameLst>
-                                      </p:cBhvr>
-                                      <p:to>
-                                        <p:strVal val="visible"/>
-                                      </p:to>
-                                    </p:set>
-                                  </p:childTnLst>
-                                </p:cTn>
-                              </p:par>
-                            </p:childTnLst>
-                          </p:cTn>
-                        </p:par>
-                        <p:par>
-                          <p:cTn id="13" fill="hold">
-                            <p:stCondLst>
-                              <p:cond delay="0"/>
-                            </p:stCondLst>
-                            <p:childTnLst>
-                              <p:par>
-                                <p:cTn id="14" presetClass="entr" nodeType="afterEffect" presetSubtype="0" presetID="1" grpId="4" fill="hold">
-                                  <p:stCondLst>
-                                    <p:cond delay="0"/>
-                                  </p:stCondLst>
-                                  <p:iterate type="el" backwards="0">
-                                    <p:tmAbs val="0"/>
-                                  </p:iterate>
-                                  <p:childTnLst>
-                                    <p:set>
-                                      <p:cBhvr>
-                                        <p:cTn id="15" fill="hold"/>
-                                        <p:tgtEl>
-                                          <p:spTgt spid="174"/>
-                                        </p:tgtEl>
-                                        <p:attrNameLst>
-                                          <p:attrName>style.visibility</p:attrName>
-                                        </p:attrNameLst>
-                                      </p:cBhvr>
-                                      <p:to>
-                                        <p:strVal val="visible"/>
-                                      </p:to>
-                                    </p:set>
-                                  </p:childTnLst>
-                                </p:cTn>
-                              </p:par>
-                            </p:childTnLst>
-                          </p:cTn>
-                        </p:par>
-                        <p:par>
-                          <p:cTn id="16" fill="hold">
-                            <p:stCondLst>
-                              <p:cond delay="0"/>
-                            </p:stCondLst>
-                            <p:childTnLst>
-                              <p:par>
-                                <p:cTn id="17" presetClass="entr" nodeType="afterEffect" presetSubtype="0" presetID="1" grpId="5" fill="hold">
-                                  <p:stCondLst>
-                                    <p:cond delay="0"/>
-                                  </p:stCondLst>
-                                  <p:iterate type="el" backwards="0">
-                                    <p:tmAbs val="0"/>
-                                  </p:iterate>
-                                  <p:childTnLst>
-                                    <p:set>
-                                      <p:cBhvr>
-                                        <p:cTn id="18" fill="hold"/>
-                                        <p:tgtEl>
-                                          <p:spTgt spid="175"/>
-                                        </p:tgtEl>
-                                        <p:attrNameLst>
-                                          <p:attrName>style.visibility</p:attrName>
-                                        </p:attrNameLst>
-                                      </p:cBhvr>
-                                      <p:to>
-                                        <p:strVal val="visible"/>
-                                      </p:to>
-                                    </p:set>
-                                  </p:childTnLst>
-                                </p:cTn>
-                              </p:par>
-                            </p:childTnLst>
-                          </p:cTn>
-                        </p:par>
-                        <p:par>
-                          <p:cTn id="19" fill="hold">
-                            <p:stCondLst>
-                              <p:cond delay="0"/>
-                            </p:stCondLst>
-                            <p:childTnLst>
-                              <p:par>
-                                <p:cTn id="20" presetClass="entr" nodeType="afterEffect" presetSubtype="0" presetID="1" grpId="6" fill="hold">
-                                  <p:stCondLst>
-                                    <p:cond delay="0"/>
-                                  </p:stCondLst>
-                                  <p:iterate type="el" backwards="0">
-                                    <p:tmAbs val="0"/>
-                                  </p:iterate>
-                                  <p:childTnLst>
-                                    <p:set>
-                                      <p:cBhvr>
-                                        <p:cTn id="21" fill="hold"/>
-                                        <p:tgtEl>
-                                          <p:spTgt spid="176"/>
-                                        </p:tgtEl>
-                                        <p:attrNameLst>
-                                          <p:attrName>style.visibility</p:attrName>
-                                        </p:attrNameLst>
-                                      </p:cBhvr>
-                                      <p:to>
-                                        <p:strVal val="visible"/>
-                                      </p:to>
-                                    </p:set>
-                                  </p:childTnLst>
-                                </p:cTn>
-                              </p:par>
-                            </p:childTnLst>
-                          </p:cTn>
-                        </p:par>
-                      </p:childTnLst>
-                    </p:cTn>
-                  </p:par>
-                </p:childTnLst>
-              </p:cTn>
-              <p:prevCondLst>
-                <p:cond evt="onPrev">
-                  <p:tgtEl>
-                    <p:sldTgt/>
-                  </p:tgtEl>
-                </p:cond>
-              </p:prevCondLst>
-              <p:nextCondLst>
-                <p:cond evt="onNext">
-                  <p:tgtEl>
-                    <p:sldTgt/>
-                  </p:tgtEl>
-                </p:cond>
-              </p:nextCondLst>
-            </p:seq>
-          </p:childTnLst>
-        </p:cTn>
-      </p:par>
-    </p:tnLst>
-    <p:bldLst>
-      <p:bldP build="whole" bldLvl="1" animBg="1" rev="0" advAuto="0" spid="171" grpId="3"/>
-      <p:bldP build="whole" bldLvl="1" animBg="1" rev="0" advAuto="0" spid="174" grpId="4"/>
-      <p:bldP build="whole" bldLvl="1" animBg="1" rev="0" advAuto="0" spid="176" grpId="6"/>
-      <p:bldP build="whole" bldLvl="1" animBg="1" rev="0" advAuto="0" spid="175" grpId="5"/>
-      <p:bldP build="whole" bldLvl="1" animBg="1" rev="0" advAuto="0" spid="173" grpId="2"/>
-      <p:bldP build="whole" bldLvl="1" animBg="1" rev="0" advAuto="0" spid="172" grpId="1"/>
-    </p:bldLst>
-  </p:timing>
 </p:sld>
 </file>
 
@@ -6179,7 +6593,7 @@
         </p:nvSpPr>
         <p:spPr>
           <a:xfrm>
-            <a:off x="3937288" y="5407460"/>
+            <a:off x="5461288" y="5407460"/>
             <a:ext cx="774548" cy="3709029"/>
           </a:xfrm>
           <a:prstGeom prst="rect">
@@ -6210,7 +6624,7 @@
         </p:nvSpPr>
         <p:spPr>
           <a:xfrm>
-            <a:off x="4254479" y="2661390"/>
+            <a:off x="4254479" y="3156690"/>
             <a:ext cx="2830794" cy="271560"/>
           </a:xfrm>
           <a:prstGeom prst="rect">
@@ -6241,7 +6655,7 @@
         </p:nvSpPr>
         <p:spPr>
           <a:xfrm>
-            <a:off x="4254479" y="2914085"/>
+            <a:off x="4254479" y="3396221"/>
             <a:ext cx="2830794" cy="271560"/>
           </a:xfrm>
           <a:prstGeom prst="rect">
@@ -6272,8 +6686,8 @@
         </p:nvSpPr>
         <p:spPr>
           <a:xfrm>
-            <a:off x="4254479" y="3156674"/>
-            <a:ext cx="2830794" cy="271560"/>
+            <a:off x="7094781" y="2908774"/>
+            <a:ext cx="2830794" cy="271559"/>
           </a:xfrm>
           <a:prstGeom prst="rect">
             <a:avLst/>
@@ -6303,7 +6717,38 @@
         </p:nvSpPr>
         <p:spPr>
           <a:xfrm>
-            <a:off x="4688371" y="5407460"/>
+            <a:off x="7094781" y="3151363"/>
+            <a:ext cx="2830794" cy="271559"/>
+          </a:xfrm>
+          <a:prstGeom prst="rect">
+            <a:avLst/>
+          </a:prstGeom>
+          <a:ln w="25400">
+            <a:solidFill>
+              <a:srgbClr val="000000"/>
+            </a:solidFill>
+            <a:miter lim="400000"/>
+          </a:ln>
+        </p:spPr>
+        <p:txBody>
+          <a:bodyPr lIns="50800" tIns="50800" rIns="50800" bIns="50800" anchor="ctr"/>
+          <a:lstStyle/>
+          <a:p>
+            <a:pPr>
+              <a:defRPr sz="2400"/>
+            </a:pPr>
+          </a:p>
+        </p:txBody>
+      </p:sp>
+      <p:sp>
+        <p:nvSpPr>
+          <p:cNvPr id="187" name="Shape 187"/>
+          <p:cNvSpPr/>
+          <p:nvPr/>
+        </p:nvSpPr>
+        <p:spPr>
+          <a:xfrm>
+            <a:off x="6191326" y="5407460"/>
             <a:ext cx="774548" cy="3709029"/>
           </a:xfrm>
           <a:prstGeom prst="rect">
@@ -6328,13 +6773,13 @@
       </p:sp>
       <p:sp>
         <p:nvSpPr>
-          <p:cNvPr id="187" name="Shape 187"/>
+          <p:cNvPr id="188" name="Shape 188"/>
           <p:cNvSpPr/>
           <p:nvPr/>
         </p:nvSpPr>
         <p:spPr>
           <a:xfrm>
-            <a:off x="5429294" y="5407460"/>
+            <a:off x="7689544" y="5407460"/>
             <a:ext cx="774548" cy="3709029"/>
           </a:xfrm>
           <a:prstGeom prst="rect">
@@ -6357,12 +6802,300 @@
           </a:p>
         </p:txBody>
       </p:sp>
+      <p:sp>
+        <p:nvSpPr>
+          <p:cNvPr id="189" name="Shape 189"/>
+          <p:cNvSpPr/>
+          <p:nvPr/>
+        </p:nvSpPr>
+        <p:spPr>
+          <a:xfrm>
+            <a:off x="8432664" y="5407460"/>
+            <a:ext cx="774548" cy="3709029"/>
+          </a:xfrm>
+          <a:prstGeom prst="rect">
+            <a:avLst/>
+          </a:prstGeom>
+          <a:ln w="50800">
+            <a:solidFill>
+              <a:srgbClr val="000000"/>
+            </a:solidFill>
+            <a:miter lim="400000"/>
+          </a:ln>
+        </p:spPr>
+        <p:txBody>
+          <a:bodyPr lIns="50800" tIns="50800" rIns="50800" bIns="50800" anchor="ctr"/>
+          <a:lstStyle/>
+          <a:p>
+            <a:pPr>
+              <a:defRPr sz="2400"/>
+            </a:pPr>
+          </a:p>
+        </p:txBody>
+      </p:sp>
     </p:spTree>
   </p:cSld>
   <p:clrMapOvr>
     <a:masterClrMapping/>
   </p:clrMapOvr>
   <p:transition xmlns:p14="http://schemas.microsoft.com/office/powerpoint/2010/main" spd="med" advClick="1" p14:dur="1000"/>
+  <p:timing>
+    <p:tnLst>
+      <p:par>
+        <p:cTn id="1" nodeType="tmRoot" restart="never" dur="indefinite" fill="hold">
+          <p:childTnLst>
+            <p:seq concurrent="1" prevAc="none" nextAc="seek">
+              <p:cTn id="2" nodeType="mainSeq" dur="indefinite" fill="hold">
+                <p:childTnLst>
+                  <p:par>
+                    <p:cTn id="3" fill="hold">
+                      <p:stCondLst>
+                        <p:cond delay="indefinite"/>
+                      </p:stCondLst>
+                      <p:childTnLst>
+                        <p:par>
+                          <p:cTn id="4" fill="hold">
+                            <p:stCondLst>
+                              <p:cond delay="0"/>
+                            </p:stCondLst>
+                            <p:childTnLst>
+                              <p:par>
+                                <p:cTn id="5" presetClass="entr" nodeType="clickEffect" presetSubtype="0" presetID="1" grpId="1" fill="hold">
+                                  <p:stCondLst>
+                                    <p:cond delay="0"/>
+                                  </p:stCondLst>
+                                  <p:iterate type="el" backwards="0">
+                                    <p:tmAbs val="0"/>
+                                  </p:iterate>
+                                  <p:childTnLst>
+                                    <p:set>
+                                      <p:cBhvr>
+                                        <p:cTn id="6" fill="hold"/>
+                                        <p:tgtEl>
+                                          <p:spTgt spid="185"/>
+                                        </p:tgtEl>
+                                        <p:attrNameLst>
+                                          <p:attrName>style.visibility</p:attrName>
+                                        </p:attrNameLst>
+                                      </p:cBhvr>
+                                      <p:to>
+                                        <p:strVal val="visible"/>
+                                      </p:to>
+                                    </p:set>
+                                  </p:childTnLst>
+                                </p:cTn>
+                              </p:par>
+                            </p:childTnLst>
+                          </p:cTn>
+                        </p:par>
+                        <p:par>
+                          <p:cTn id="7" fill="hold">
+                            <p:stCondLst>
+                              <p:cond delay="0"/>
+                            </p:stCondLst>
+                            <p:childTnLst>
+                              <p:par>
+                                <p:cTn id="8" presetClass="entr" nodeType="afterEffect" presetSubtype="0" presetID="1" grpId="2" fill="hold">
+                                  <p:stCondLst>
+                                    <p:cond delay="0"/>
+                                  </p:stCondLst>
+                                  <p:iterate type="el" backwards="0">
+                                    <p:tmAbs val="0"/>
+                                  </p:iterate>
+                                  <p:childTnLst>
+                                    <p:set>
+                                      <p:cBhvr>
+                                        <p:cTn id="9" fill="hold"/>
+                                        <p:tgtEl>
+                                          <p:spTgt spid="186"/>
+                                        </p:tgtEl>
+                                        <p:attrNameLst>
+                                          <p:attrName>style.visibility</p:attrName>
+                                        </p:attrNameLst>
+                                      </p:cBhvr>
+                                      <p:to>
+                                        <p:strVal val="visible"/>
+                                      </p:to>
+                                    </p:set>
+                                  </p:childTnLst>
+                                </p:cTn>
+                              </p:par>
+                            </p:childTnLst>
+                          </p:cTn>
+                        </p:par>
+                        <p:par>
+                          <p:cTn id="10" fill="hold">
+                            <p:stCondLst>
+                              <p:cond delay="0"/>
+                            </p:stCondLst>
+                            <p:childTnLst>
+                              <p:par>
+                                <p:cTn id="11" presetClass="entr" nodeType="afterEffect" presetSubtype="0" presetID="1" grpId="3" fill="hold">
+                                  <p:stCondLst>
+                                    <p:cond delay="0"/>
+                                  </p:stCondLst>
+                                  <p:iterate type="el" backwards="0">
+                                    <p:tmAbs val="0"/>
+                                  </p:iterate>
+                                  <p:childTnLst>
+                                    <p:set>
+                                      <p:cBhvr>
+                                        <p:cTn id="12" fill="hold"/>
+                                        <p:tgtEl>
+                                          <p:spTgt spid="184"/>
+                                        </p:tgtEl>
+                                        <p:attrNameLst>
+                                          <p:attrName>style.visibility</p:attrName>
+                                        </p:attrNameLst>
+                                      </p:cBhvr>
+                                      <p:to>
+                                        <p:strVal val="visible"/>
+                                      </p:to>
+                                    </p:set>
+                                  </p:childTnLst>
+                                </p:cTn>
+                              </p:par>
+                            </p:childTnLst>
+                          </p:cTn>
+                        </p:par>
+                        <p:par>
+                          <p:cTn id="13" fill="hold">
+                            <p:stCondLst>
+                              <p:cond delay="0"/>
+                            </p:stCondLst>
+                            <p:childTnLst>
+                              <p:par>
+                                <p:cTn id="14" presetClass="entr" nodeType="afterEffect" presetSubtype="0" presetID="1" grpId="4" fill="hold">
+                                  <p:stCondLst>
+                                    <p:cond delay="0"/>
+                                  </p:stCondLst>
+                                  <p:iterate type="el" backwards="0">
+                                    <p:tmAbs val="0"/>
+                                  </p:iterate>
+                                  <p:childTnLst>
+                                    <p:set>
+                                      <p:cBhvr>
+                                        <p:cTn id="15" fill="hold"/>
+                                        <p:tgtEl>
+                                          <p:spTgt spid="187"/>
+                                        </p:tgtEl>
+                                        <p:attrNameLst>
+                                          <p:attrName>style.visibility</p:attrName>
+                                        </p:attrNameLst>
+                                      </p:cBhvr>
+                                      <p:to>
+                                        <p:strVal val="visible"/>
+                                      </p:to>
+                                    </p:set>
+                                  </p:childTnLst>
+                                </p:cTn>
+                              </p:par>
+                            </p:childTnLst>
+                          </p:cTn>
+                        </p:par>
+                        <p:par>
+                          <p:cTn id="16" fill="hold">
+                            <p:stCondLst>
+                              <p:cond delay="0"/>
+                            </p:stCondLst>
+                            <p:childTnLst>
+                              <p:par>
+                                <p:cTn id="17" presetClass="entr" nodeType="afterEffect" presetSubtype="0" presetID="1" grpId="5" fill="hold">
+                                  <p:stCondLst>
+                                    <p:cond delay="0"/>
+                                  </p:stCondLst>
+                                  <p:iterate type="el" backwards="0">
+                                    <p:tmAbs val="0"/>
+                                  </p:iterate>
+                                  <p:childTnLst>
+                                    <p:set>
+                                      <p:cBhvr>
+                                        <p:cTn id="18" fill="hold"/>
+                                        <p:tgtEl>
+                                          <p:spTgt spid="188"/>
+                                        </p:tgtEl>
+                                        <p:attrNameLst>
+                                          <p:attrName>style.visibility</p:attrName>
+                                        </p:attrNameLst>
+                                      </p:cBhvr>
+                                      <p:to>
+                                        <p:strVal val="visible"/>
+                                      </p:to>
+                                    </p:set>
+                                  </p:childTnLst>
+                                </p:cTn>
+                              </p:par>
+                            </p:childTnLst>
+                          </p:cTn>
+                        </p:par>
+                        <p:par>
+                          <p:cTn id="19" fill="hold">
+                            <p:stCondLst>
+                              <p:cond delay="0"/>
+                            </p:stCondLst>
+                            <p:childTnLst>
+                              <p:par>
+                                <p:cTn id="20" presetClass="entr" nodeType="afterEffect" presetSubtype="0" presetID="1" grpId="6" fill="hold">
+                                  <p:stCondLst>
+                                    <p:cond delay="0"/>
+                                  </p:stCondLst>
+                                  <p:iterate type="el" backwards="0">
+                                    <p:tmAbs val="0"/>
+                                  </p:iterate>
+                                  <p:childTnLst>
+                                    <p:set>
+                                      <p:cBhvr>
+                                        <p:cTn id="21" fill="hold"/>
+                                        <p:tgtEl>
+                                          <p:spTgt spid="189"/>
+                                        </p:tgtEl>
+                                        <p:attrNameLst>
+                                          <p:attrName>style.visibility</p:attrName>
+                                        </p:attrNameLst>
+                                      </p:cBhvr>
+                                      <p:to>
+                                        <p:strVal val="visible"/>
+                                      </p:to>
+                                    </p:set>
+                                  </p:childTnLst>
+                                </p:cTn>
+                              </p:par>
+                            </p:childTnLst>
+                          </p:cTn>
+                        </p:par>
+                      </p:childTnLst>
+                    </p:cTn>
+                  </p:par>
+                </p:childTnLst>
+              </p:cTn>
+              <p:prevCondLst>
+                <p:cond evt="onPrev">
+                  <p:tgtEl>
+                    <p:sldTgt/>
+                  </p:tgtEl>
+                </p:cond>
+              </p:prevCondLst>
+              <p:nextCondLst>
+                <p:cond evt="onNext">
+                  <p:tgtEl>
+                    <p:sldTgt/>
+                  </p:tgtEl>
+                </p:cond>
+              </p:nextCondLst>
+            </p:seq>
+          </p:childTnLst>
+        </p:cTn>
+      </p:par>
+    </p:tnLst>
+    <p:bldLst>
+      <p:bldP build="whole" bldLvl="1" animBg="1" rev="0" advAuto="0" spid="184" grpId="3"/>
+      <p:bldP build="whole" bldLvl="1" animBg="1" rev="0" advAuto="0" spid="187" grpId="4"/>
+      <p:bldP build="whole" bldLvl="1" animBg="1" rev="0" advAuto="0" spid="188" grpId="5"/>
+      <p:bldP build="whole" bldLvl="1" animBg="1" rev="0" advAuto="0" spid="186" grpId="2"/>
+      <p:bldP build="whole" bldLvl="1" animBg="1" rev="0" advAuto="0" spid="189" grpId="6"/>
+      <p:bldP build="whole" bldLvl="1" animBg="1" rev="0" advAuto="0" spid="185" grpId="1"/>
+    </p:bldLst>
+  </p:timing>
 </p:sld>
 </file>
 
@@ -6385,7 +7118,7 @@
       </p:grpSpPr>
       <p:sp>
         <p:nvSpPr>
-          <p:cNvPr id="191" name="Shape 191"/>
+          <p:cNvPr id="193" name="Shape 193"/>
           <p:cNvSpPr/>
           <p:nvPr/>
         </p:nvSpPr>
@@ -6431,7 +7164,7 @@
       </p:sp>
       <p:pic>
         <p:nvPicPr>
-          <p:cNvPr id="192" name="topic_pref.pdf"/>
+          <p:cNvPr id="194" name="topic_pref.pdf"/>
           <p:cNvPicPr>
             <a:picLocks noChangeAspect="1"/>
           </p:cNvPicPr>
@@ -6460,7 +7193,7 @@
       </p:pic>
       <p:sp>
         <p:nvSpPr>
-          <p:cNvPr id="193" name="Shape 193"/>
+          <p:cNvPr id="195" name="Shape 195"/>
           <p:cNvSpPr/>
           <p:nvPr/>
         </p:nvSpPr>
@@ -6491,7 +7224,7 @@
       </p:sp>
       <p:sp>
         <p:nvSpPr>
-          <p:cNvPr id="194" name="Shape 194"/>
+          <p:cNvPr id="196" name="Shape 196"/>
           <p:cNvSpPr/>
           <p:nvPr/>
         </p:nvSpPr>
@@ -6548,14 +7281,14 @@
       </p:grpSpPr>
       <p:sp>
         <p:nvSpPr>
-          <p:cNvPr id="198" name="Shape 198"/>
+          <p:cNvPr id="200" name="Shape 200"/>
           <p:cNvSpPr/>
           <p:nvPr/>
         </p:nvSpPr>
         <p:spPr>
           <a:xfrm>
-            <a:off x="1610360" y="357429"/>
-            <a:ext cx="9784081" cy="1625601"/>
+            <a:off x="15240" y="357429"/>
+            <a:ext cx="12974320" cy="1625601"/>
           </a:xfrm>
           <a:prstGeom prst="rect">
             <a:avLst/>
@@ -6570,7 +7303,7 @@
           </a:extLst>
         </p:spPr>
         <p:txBody>
-          <a:bodyPr wrap="none" lIns="50800" tIns="50800" rIns="50800" bIns="50800" anchor="ctr">
+          <a:bodyPr lIns="50800" tIns="50800" rIns="50800" bIns="50800" anchor="ctr">
             <a:spAutoFit/>
           </a:bodyPr>
           <a:lstStyle>
@@ -6581,21 +7314,21 @@
           <a:p>
             <a:pPr/>
             <a:r>
-              <a:t>Other questions?</a:t>
+              <a:t>Flash survey qs</a:t>
             </a:r>
           </a:p>
         </p:txBody>
       </p:sp>
       <p:sp>
         <p:nvSpPr>
-          <p:cNvPr id="199" name="Shape 199"/>
+          <p:cNvPr id="201" name="Shape 201"/>
           <p:cNvSpPr/>
           <p:nvPr/>
         </p:nvSpPr>
         <p:spPr>
           <a:xfrm>
-            <a:off x="1016317" y="3846886"/>
-            <a:ext cx="10972166" cy="863601"/>
+            <a:off x="3422332" y="2556239"/>
+            <a:ext cx="6160136" cy="863601"/>
           </a:xfrm>
           <a:prstGeom prst="rect">
             <a:avLst/>
@@ -6621,21 +7354,21 @@
           <a:p>
             <a:pPr/>
             <a:r>
-              <a:t>Language? French, English, bilingual?</a:t>
+              <a:t>Academia / Industry?</a:t>
             </a:r>
           </a:p>
         </p:txBody>
       </p:sp>
       <p:sp>
         <p:nvSpPr>
-          <p:cNvPr id="200" name="Shape 200"/>
+          <p:cNvPr id="202" name="Shape 202"/>
           <p:cNvSpPr/>
           <p:nvPr/>
         </p:nvSpPr>
         <p:spPr>
           <a:xfrm>
-            <a:off x="4419917" y="6155170"/>
-            <a:ext cx="4418966" cy="863601"/>
+            <a:off x="3272154" y="4444999"/>
+            <a:ext cx="6714491" cy="863601"/>
           </a:xfrm>
           <a:prstGeom prst="rect">
             <a:avLst/>
@@ -6661,7 +7394,47 @@
           <a:p>
             <a:pPr/>
             <a:r>
-              <a:t>Meeting times?</a:t>
+              <a:t>What do you use R for?</a:t>
+            </a:r>
+          </a:p>
+        </p:txBody>
+      </p:sp>
+      <p:sp>
+        <p:nvSpPr>
+          <p:cNvPr id="203" name="Shape 203"/>
+          <p:cNvSpPr/>
+          <p:nvPr/>
+        </p:nvSpPr>
+        <p:spPr>
+          <a:xfrm>
+            <a:off x="2789872" y="6646158"/>
+            <a:ext cx="7679056" cy="863601"/>
+          </a:xfrm>
+          <a:prstGeom prst="rect">
+            <a:avLst/>
+          </a:prstGeom>
+          <a:ln w="12700">
+            <a:miter lim="400000"/>
+          </a:ln>
+          <a:extLst>
+            <a:ext uri="{C572A759-6A51-4108-AA02-DFA0A04FC94B}">
+              <ma14:wrappingTextBoxFlag xmlns:ma14="http://schemas.microsoft.com/office/mac/drawingml/2011/main" val="1"/>
+            </a:ext>
+          </a:extLst>
+        </p:spPr>
+        <p:txBody>
+          <a:bodyPr wrap="none" lIns="50800" tIns="50800" rIns="50800" bIns="50800" anchor="ctr">
+            <a:spAutoFit/>
+          </a:bodyPr>
+          <a:lstStyle>
+            <a:lvl1pPr>
+              <a:defRPr sz="5000"/>
+            </a:lvl1pPr>
+          </a:lstStyle>
+          <a:p>
+            <a:pPr/>
+            <a:r>
+              <a:t>Are you in other R groups?</a:t>
             </a:r>
           </a:p>
         </p:txBody>
@@ -6672,6 +7445,173 @@
     <a:masterClrMapping/>
   </p:clrMapOvr>
   <p:transition xmlns:p14="http://schemas.microsoft.com/office/powerpoint/2010/main" spd="med" advClick="1" p14:dur="1000"/>
+  <p:timing>
+    <p:tnLst>
+      <p:par>
+        <p:cTn id="1" nodeType="tmRoot" restart="never" dur="indefinite" fill="hold">
+          <p:childTnLst>
+            <p:seq concurrent="1" prevAc="none" nextAc="seek">
+              <p:cTn id="2" nodeType="mainSeq" dur="indefinite" fill="hold">
+                <p:childTnLst>
+                  <p:par>
+                    <p:cTn id="3" fill="hold">
+                      <p:stCondLst>
+                        <p:cond delay="indefinite"/>
+                      </p:stCondLst>
+                      <p:childTnLst>
+                        <p:par>
+                          <p:cTn id="4" fill="hold">
+                            <p:stCondLst>
+                              <p:cond delay="0"/>
+                            </p:stCondLst>
+                            <p:childTnLst>
+                              <p:par>
+                                <p:cTn id="5" presetClass="entr" nodeType="clickEffect" presetSubtype="0" presetID="1" grpId="1" fill="hold">
+                                  <p:stCondLst>
+                                    <p:cond delay="0"/>
+                                  </p:stCondLst>
+                                  <p:iterate type="el" backwards="0">
+                                    <p:tmAbs val="0"/>
+                                  </p:iterate>
+                                  <p:childTnLst>
+                                    <p:set>
+                                      <p:cBhvr>
+                                        <p:cTn id="6" fill="hold"/>
+                                        <p:tgtEl>
+                                          <p:spTgt spid="201"/>
+                                        </p:tgtEl>
+                                        <p:attrNameLst>
+                                          <p:attrName>style.visibility</p:attrName>
+                                        </p:attrNameLst>
+                                      </p:cBhvr>
+                                      <p:to>
+                                        <p:strVal val="visible"/>
+                                      </p:to>
+                                    </p:set>
+                                  </p:childTnLst>
+                                </p:cTn>
+                              </p:par>
+                            </p:childTnLst>
+                          </p:cTn>
+                        </p:par>
+                      </p:childTnLst>
+                    </p:cTn>
+                  </p:par>
+                  <p:par>
+                    <p:cTn id="7" fill="hold">
+                      <p:stCondLst>
+                        <p:cond delay="indefinite"/>
+                      </p:stCondLst>
+                      <p:childTnLst>
+                        <p:par>
+                          <p:cTn id="8" fill="hold">
+                            <p:stCondLst>
+                              <p:cond delay="0"/>
+                            </p:stCondLst>
+                            <p:childTnLst>
+                              <p:par>
+                                <p:cTn id="9" presetClass="entr" nodeType="clickEffect" presetSubtype="0" presetID="1" grpId="2" fill="hold">
+                                  <p:stCondLst>
+                                    <p:cond delay="0"/>
+                                  </p:stCondLst>
+                                  <p:iterate type="el" backwards="0">
+                                    <p:tmAbs val="0"/>
+                                  </p:iterate>
+                                  <p:childTnLst>
+                                    <p:set>
+                                      <p:cBhvr>
+                                        <p:cTn id="10" fill="hold"/>
+                                        <p:tgtEl>
+                                          <p:spTgt spid="202"/>
+                                        </p:tgtEl>
+                                        <p:attrNameLst>
+                                          <p:attrName>style.visibility</p:attrName>
+                                        </p:attrNameLst>
+                                      </p:cBhvr>
+                                      <p:to>
+                                        <p:strVal val="visible"/>
+                                      </p:to>
+                                    </p:set>
+                                  </p:childTnLst>
+                                </p:cTn>
+                              </p:par>
+                            </p:childTnLst>
+                          </p:cTn>
+                        </p:par>
+                      </p:childTnLst>
+                    </p:cTn>
+                  </p:par>
+                  <p:par>
+                    <p:cTn id="11" fill="hold">
+                      <p:stCondLst>
+                        <p:cond delay="indefinite"/>
+                      </p:stCondLst>
+                      <p:childTnLst>
+                        <p:par>
+                          <p:cTn id="12" fill="hold">
+                            <p:stCondLst>
+                              <p:cond delay="0"/>
+                            </p:stCondLst>
+                            <p:childTnLst>
+                              <p:par>
+                                <p:cTn id="13" presetClass="entr" nodeType="clickEffect" presetSubtype="0" presetID="1" grpId="3" fill="hold">
+                                  <p:stCondLst>
+                                    <p:cond delay="0"/>
+                                  </p:stCondLst>
+                                  <p:iterate type="el" backwards="0">
+                                    <p:tmAbs val="0"/>
+                                  </p:iterate>
+                                  <p:childTnLst>
+                                    <p:set>
+                                      <p:cBhvr>
+                                        <p:cTn id="14" fill="hold"/>
+                                        <p:tgtEl>
+                                          <p:spTgt spid="203"/>
+                                        </p:tgtEl>
+                                        <p:attrNameLst>
+                                          <p:attrName>style.visibility</p:attrName>
+                                        </p:attrNameLst>
+                                      </p:cBhvr>
+                                      <p:to>
+                                        <p:strVal val="visible"/>
+                                      </p:to>
+                                    </p:set>
+                                  </p:childTnLst>
+                                </p:cTn>
+                              </p:par>
+                            </p:childTnLst>
+                          </p:cTn>
+                        </p:par>
+                      </p:childTnLst>
+                    </p:cTn>
+                  </p:par>
+                </p:childTnLst>
+              </p:cTn>
+              <p:prevCondLst>
+                <p:cond evt="onPrev">
+                  <p:tgtEl>
+                    <p:sldTgt/>
+                  </p:tgtEl>
+                </p:cond>
+              </p:prevCondLst>
+              <p:nextCondLst>
+                <p:cond evt="onNext">
+                  <p:tgtEl>
+                    <p:sldTgt/>
+                  </p:tgtEl>
+                </p:cond>
+              </p:nextCondLst>
+            </p:seq>
+          </p:childTnLst>
+        </p:cTn>
+      </p:par>
+    </p:tnLst>
+    <p:bldLst>
+      <p:bldP build="whole" bldLvl="1" animBg="1" rev="0" advAuto="0" spid="202" grpId="2"/>
+      <p:bldP build="whole" bldLvl="1" animBg="1" rev="0" advAuto="0" spid="203" grpId="3"/>
+      <p:bldP build="whole" bldLvl="1" animBg="1" rev="0" advAuto="0" spid="201" grpId="1"/>
+    </p:bldLst>
+  </p:timing>
 </p:sld>
 </file>
 

</xml_diff>

<commit_message>
Update data. Update presentation with new data.
</commit_message>
<xml_diff>
--- a/presentation/inaugural_meeting_2016-10-05_presentation.pptx
+++ b/presentation/inaugural_meeting_2016-10-05_presentation.pptx
@@ -589,7 +589,7 @@
       </p:grpSpPr>
       <p:sp>
         <p:nvSpPr>
-          <p:cNvPr id="131" name="Shape 131"/>
+          <p:cNvPr id="163" name="Shape 163"/>
           <p:cNvSpPr/>
           <p:nvPr>
             <p:ph type="sldImg"/>
@@ -610,7 +610,7 @@
       </p:sp>
       <p:sp>
         <p:nvSpPr>
-          <p:cNvPr id="132" name="Shape 132"/>
+          <p:cNvPr id="164" name="Shape 164"/>
           <p:cNvSpPr/>
           <p:nvPr>
             <p:ph type="body" sz="quarter" idx="1"/>
@@ -623,11 +623,26 @@
         </p:spPr>
         <p:txBody>
           <a:bodyPr/>
-          <a:lstStyle/>
+          <a:lstStyle>
+            <a:lvl1pPr marL="271638" indent="-271638">
+              <a:buSzPct val="75000"/>
+              <a:buChar char="-"/>
+            </a:lvl1pPr>
+            <a:lvl2pPr marL="716138" indent="-271638">
+              <a:buSzPct val="75000"/>
+              <a:buChar char="-"/>
+            </a:lvl2pPr>
+          </a:lstStyle>
           <a:p>
             <a:pPr/>
             <a:r>
-              <a:t>- not sure where the best place for this slide is</a:t>
+              <a:t>have a round of who is present before animating survey results</a:t>
+            </a:r>
+          </a:p>
+          <a:p>
+            <a:pPr lvl="1"/>
+            <a:r>
+              <a:t>—&gt; name, where work, etc.</a:t>
             </a:r>
           </a:p>
         </p:txBody>
@@ -4190,11 +4205,11 @@
     </p:tnLst>
     <p:bldLst>
       <p:bldP build="whole" bldLvl="1" animBg="1" rev="0" advAuto="0" spid="208" grpId="6"/>
-      <p:bldP build="whole" bldLvl="1" animBg="1" rev="0" advAuto="0" spid="210" grpId="4"/>
+      <p:bldP build="whole" bldLvl="1" animBg="1" rev="0" advAuto="0" spid="211" grpId="3"/>
       <p:bldP build="whole" bldLvl="1" animBg="1" rev="0" advAuto="0" spid="206" grpId="1"/>
-      <p:bldP build="whole" bldLvl="1" animBg="1" rev="0" advAuto="0" spid="211" grpId="3"/>
       <p:bldP build="whole" bldLvl="1" animBg="1" rev="0" advAuto="0" spid="207" grpId="2"/>
       <p:bldP build="whole" bldLvl="1" animBg="1" rev="0" advAuto="0" spid="209" grpId="5"/>
+      <p:bldP build="whole" bldLvl="1" animBg="1" rev="0" advAuto="0" spid="210" grpId="4"/>
     </p:bldLst>
   </p:timing>
 </p:sld>
@@ -4266,7 +4281,7 @@
           <p:nvPr/>
         </p:nvPicPr>
         <p:blipFill>
-          <a:blip r:embed="rId3">
+          <a:blip r:embed="rId2">
             <a:extLst/>
           </a:blip>
           <a:stretch>
@@ -4295,7 +4310,7 @@
           <p:nvPr/>
         </p:nvPicPr>
         <p:blipFill>
-          <a:blip r:embed="rId4">
+          <a:blip r:embed="rId3">
             <a:extLst/>
           </a:blip>
           <a:stretch>
@@ -4439,8 +4454,8 @@
       </p:par>
     </p:tnLst>
     <p:bldLst>
+      <p:bldP build="whole" bldLvl="1" animBg="1" rev="0" advAuto="0" spid="130" grpId="2"/>
       <p:bldP build="whole" bldLvl="1" animBg="1" rev="0" advAuto="0" spid="129" grpId="1"/>
-      <p:bldP build="whole" bldLvl="1" animBg="1" rev="0" advAuto="0" spid="130" grpId="2"/>
     </p:bldLst>
   </p:timing>
 </p:sld>
@@ -4465,7 +4480,7 @@
       </p:grpSpPr>
       <p:grpSp>
         <p:nvGrpSpPr>
-          <p:cNvPr id="136" name="Group 136"/>
+          <p:cNvPr id="134" name="Group 134"/>
           <p:cNvGrpSpPr/>
           <p:nvPr/>
         </p:nvGrpSpPr>
@@ -4479,7 +4494,7 @@
         </p:grpSpPr>
         <p:pic>
           <p:nvPicPr>
-            <p:cNvPr id="134" name="diane_beldame.jpg"/>
+            <p:cNvPr id="132" name="diane_beldame.jpg"/>
             <p:cNvPicPr>
               <a:picLocks noChangeAspect="1"/>
             </p:cNvPicPr>
@@ -4510,7 +4525,7 @@
         </p:pic>
         <p:sp>
           <p:nvSpPr>
-            <p:cNvPr id="135" name="Shape 135"/>
+            <p:cNvPr id="133" name="Shape 133"/>
             <p:cNvSpPr/>
             <p:nvPr/>
           </p:nvSpPr>
@@ -4559,7 +4574,7 @@
       </p:grpSp>
       <p:grpSp>
         <p:nvGrpSpPr>
-          <p:cNvPr id="139" name="Group 139"/>
+          <p:cNvPr id="137" name="Group 137"/>
           <p:cNvGrpSpPr/>
           <p:nvPr/>
         </p:nvGrpSpPr>
@@ -4573,7 +4588,7 @@
         </p:grpSpPr>
         <p:pic>
           <p:nvPicPr>
-            <p:cNvPr id="137" name="christina_bergmann.jpg"/>
+            <p:cNvPr id="135" name="christina_bergmann.jpg"/>
             <p:cNvPicPr>
               <a:picLocks noChangeAspect="1"/>
             </p:cNvPicPr>
@@ -4605,7 +4620,7 @@
         </p:pic>
         <p:sp>
           <p:nvSpPr>
-            <p:cNvPr id="138" name="Shape 138"/>
+            <p:cNvPr id="136" name="Shape 136"/>
             <p:cNvSpPr/>
             <p:nvPr/>
           </p:nvSpPr>
@@ -4654,7 +4669,7 @@
       </p:grpSp>
       <p:grpSp>
         <p:nvGrpSpPr>
-          <p:cNvPr id="142" name="Group 142"/>
+          <p:cNvPr id="140" name="Group 140"/>
           <p:cNvGrpSpPr/>
           <p:nvPr/>
         </p:nvGrpSpPr>
@@ -4668,7 +4683,7 @@
         </p:grpSpPr>
         <p:pic>
           <p:nvPicPr>
-            <p:cNvPr id="140" name="page_piccinini.png"/>
+            <p:cNvPr id="138" name="page_piccinini.png"/>
             <p:cNvPicPr>
               <a:picLocks noChangeAspect="1"/>
             </p:cNvPicPr>
@@ -4699,7 +4714,7 @@
         </p:pic>
         <p:sp>
           <p:nvSpPr>
-            <p:cNvPr id="141" name="Shape 141"/>
+            <p:cNvPr id="139" name="Shape 139"/>
             <p:cNvSpPr/>
             <p:nvPr/>
           </p:nvSpPr>
@@ -4748,7 +4763,7 @@
       </p:grpSp>
       <p:sp>
         <p:nvSpPr>
-          <p:cNvPr id="143" name="Shape 143"/>
+          <p:cNvPr id="141" name="Shape 141"/>
           <p:cNvSpPr/>
           <p:nvPr/>
         </p:nvSpPr>
@@ -4825,7 +4840,7 @@
                                       <p:cBhvr>
                                         <p:cTn id="6" fill="hold"/>
                                         <p:tgtEl>
-                                          <p:spTgt spid="136"/>
+                                          <p:spTgt spid="134"/>
                                         </p:tgtEl>
                                         <p:attrNameLst>
                                           <p:attrName>style.visibility</p:attrName>
@@ -4860,7 +4875,7 @@
                                       <p:cBhvr>
                                         <p:cTn id="9" fill="hold"/>
                                         <p:tgtEl>
-                                          <p:spTgt spid="139"/>
+                                          <p:spTgt spid="137"/>
                                         </p:tgtEl>
                                         <p:attrNameLst>
                                           <p:attrName>style.visibility</p:attrName>
@@ -4895,7 +4910,7 @@
                                       <p:cBhvr>
                                         <p:cTn id="12" fill="hold"/>
                                         <p:tgtEl>
-                                          <p:spTgt spid="142"/>
+                                          <p:spTgt spid="140"/>
                                         </p:tgtEl>
                                         <p:attrNameLst>
                                           <p:attrName>style.visibility</p:attrName>
@@ -4936,9 +4951,9 @@
       </p:par>
     </p:tnLst>
     <p:bldLst>
-      <p:bldP build="whole" bldLvl="1" animBg="1" rev="0" advAuto="0" spid="139" grpId="2"/>
-      <p:bldP build="whole" bldLvl="1" animBg="1" rev="0" advAuto="0" spid="142" grpId="3"/>
-      <p:bldP build="whole" bldLvl="1" animBg="1" rev="0" advAuto="0" spid="136" grpId="1"/>
+      <p:bldP build="whole" bldLvl="1" animBg="1" rev="0" advAuto="0" spid="137" grpId="2"/>
+      <p:bldP build="whole" bldLvl="1" animBg="1" rev="0" advAuto="0" spid="134" grpId="1"/>
+      <p:bldP build="whole" bldLvl="1" animBg="1" rev="0" advAuto="0" spid="140" grpId="3"/>
     </p:bldLst>
   </p:timing>
 </p:sld>
@@ -4963,7 +4978,7 @@
       </p:grpSpPr>
       <p:sp>
         <p:nvSpPr>
-          <p:cNvPr id="145" name="Shape 145"/>
+          <p:cNvPr id="143" name="Shape 143"/>
           <p:cNvSpPr/>
           <p:nvPr/>
         </p:nvSpPr>
@@ -5009,7 +5024,7 @@
       </p:sp>
       <p:grpSp>
         <p:nvGrpSpPr>
-          <p:cNvPr id="148" name="Group 148"/>
+          <p:cNvPr id="146" name="Group 146"/>
           <p:cNvGrpSpPr/>
           <p:nvPr/>
         </p:nvGrpSpPr>
@@ -5023,7 +5038,7 @@
         </p:grpSpPr>
         <p:sp>
           <p:nvSpPr>
-            <p:cNvPr id="146" name="Shape 146"/>
+            <p:cNvPr id="144" name="Shape 144"/>
             <p:cNvSpPr/>
             <p:nvPr/>
           </p:nvSpPr>
@@ -5064,21 +5079,21 @@
             <a:p>
               <a:pPr/>
               <a:r>
-                <a:t>33</a:t>
+                <a:t>35</a:t>
               </a:r>
             </a:p>
           </p:txBody>
         </p:sp>
         <p:pic>
           <p:nvPicPr>
-            <p:cNvPr id="147" name="person.jpg"/>
+            <p:cNvPr id="145" name="person.jpg"/>
             <p:cNvPicPr>
               <a:picLocks noChangeAspect="1"/>
             </p:cNvPicPr>
             <p:nvPr/>
           </p:nvPicPr>
           <p:blipFill>
-            <a:blip r:embed="rId2">
+            <a:blip r:embed="rId3">
               <a:extLst/>
             </a:blip>
             <a:stretch>
@@ -5103,7 +5118,7 @@
       </p:grpSp>
       <p:grpSp>
         <p:nvGrpSpPr>
-          <p:cNvPr id="151" name="Group 151"/>
+          <p:cNvPr id="149" name="Group 149"/>
           <p:cNvGrpSpPr/>
           <p:nvPr/>
         </p:nvGrpSpPr>
@@ -5117,14 +5132,14 @@
         </p:grpSpPr>
         <p:pic>
           <p:nvPicPr>
-            <p:cNvPr id="149" name="person.jpg"/>
+            <p:cNvPr id="147" name="person.jpg"/>
             <p:cNvPicPr>
               <a:picLocks noChangeAspect="1"/>
             </p:cNvPicPr>
             <p:nvPr/>
           </p:nvPicPr>
           <p:blipFill>
-            <a:blip r:embed="rId2">
+            <a:blip r:embed="rId3">
               <a:extLst/>
             </a:blip>
             <a:stretch>
@@ -5148,7 +5163,7 @@
         </p:pic>
         <p:sp>
           <p:nvSpPr>
-            <p:cNvPr id="150" name="Shape 150"/>
+            <p:cNvPr id="148" name="Shape 148"/>
             <p:cNvSpPr/>
             <p:nvPr/>
           </p:nvSpPr>
@@ -5227,7 +5242,7 @@
       </p:grpSp>
       <p:grpSp>
         <p:nvGrpSpPr>
-          <p:cNvPr id="154" name="Group 154"/>
+          <p:cNvPr id="152" name="Group 152"/>
           <p:cNvGrpSpPr/>
           <p:nvPr/>
         </p:nvGrpSpPr>
@@ -5241,14 +5256,14 @@
         </p:grpSpPr>
         <p:pic>
           <p:nvPicPr>
-            <p:cNvPr id="152" name="person.jpg"/>
+            <p:cNvPr id="150" name="person.jpg"/>
             <p:cNvPicPr>
               <a:picLocks noChangeAspect="1"/>
             </p:cNvPicPr>
             <p:nvPr/>
           </p:nvPicPr>
           <p:blipFill>
-            <a:blip r:embed="rId2">
+            <a:blip r:embed="rId3">
               <a:extLst/>
             </a:blip>
             <a:stretch>
@@ -5272,7 +5287,7 @@
         </p:pic>
         <p:sp>
           <p:nvSpPr>
-            <p:cNvPr id="153" name="Shape 153"/>
+            <p:cNvPr id="151" name="Shape 151"/>
             <p:cNvSpPr/>
             <p:nvPr/>
           </p:nvSpPr>
@@ -5346,7 +5361,7 @@
                 </a:defRPr>
               </a:pPr>
               <a:r>
-                <a:t>(4)</a:t>
+                <a:t>(5)</a:t>
               </a:r>
             </a:p>
           </p:txBody>
@@ -5354,7 +5369,7 @@
       </p:grpSp>
       <p:grpSp>
         <p:nvGrpSpPr>
-          <p:cNvPr id="157" name="Group 157"/>
+          <p:cNvPr id="155" name="Group 155"/>
           <p:cNvGrpSpPr/>
           <p:nvPr/>
         </p:nvGrpSpPr>
@@ -5368,7 +5383,7 @@
         </p:grpSpPr>
         <p:sp>
           <p:nvSpPr>
-            <p:cNvPr id="155" name="Shape 155"/>
+            <p:cNvPr id="153" name="Shape 153"/>
             <p:cNvSpPr/>
             <p:nvPr/>
           </p:nvSpPr>
@@ -5446,14 +5461,14 @@
         </p:sp>
         <p:pic>
           <p:nvPicPr>
-            <p:cNvPr id="156" name="person.jpg"/>
+            <p:cNvPr id="154" name="person.jpg"/>
             <p:cNvPicPr>
               <a:picLocks noChangeAspect="1"/>
             </p:cNvPicPr>
             <p:nvPr/>
           </p:nvPicPr>
           <p:blipFill>
-            <a:blip r:embed="rId2">
+            <a:blip r:embed="rId3">
               <a:extLst/>
             </a:blip>
             <a:stretch>
@@ -5478,7 +5493,7 @@
       </p:grpSp>
       <p:grpSp>
         <p:nvGrpSpPr>
-          <p:cNvPr id="160" name="Group 160"/>
+          <p:cNvPr id="158" name="Group 158"/>
           <p:cNvGrpSpPr/>
           <p:nvPr/>
         </p:nvGrpSpPr>
@@ -5492,7 +5507,7 @@
         </p:grpSpPr>
         <p:sp>
           <p:nvSpPr>
-            <p:cNvPr id="158" name="Shape 158"/>
+            <p:cNvPr id="156" name="Shape 156"/>
             <p:cNvSpPr/>
             <p:nvPr/>
           </p:nvSpPr>
@@ -5566,21 +5581,21 @@
                 </a:defRPr>
               </a:pPr>
               <a:r>
-                <a:t>(7)</a:t>
+                <a:t>(8)</a:t>
               </a:r>
             </a:p>
           </p:txBody>
         </p:sp>
         <p:pic>
           <p:nvPicPr>
-            <p:cNvPr id="159" name="person.jpg"/>
+            <p:cNvPr id="157" name="person.jpg"/>
             <p:cNvPicPr>
               <a:picLocks noChangeAspect="1"/>
             </p:cNvPicPr>
             <p:nvPr/>
           </p:nvPicPr>
           <p:blipFill>
-            <a:blip r:embed="rId2">
+            <a:blip r:embed="rId3">
               <a:extLst/>
             </a:blip>
             <a:stretch>
@@ -5605,7 +5620,7 @@
       </p:grpSp>
       <p:grpSp>
         <p:nvGrpSpPr>
-          <p:cNvPr id="163" name="Group 163"/>
+          <p:cNvPr id="161" name="Group 161"/>
           <p:cNvGrpSpPr/>
           <p:nvPr/>
         </p:nvGrpSpPr>
@@ -5619,7 +5634,7 @@
         </p:grpSpPr>
         <p:sp>
           <p:nvSpPr>
-            <p:cNvPr id="161" name="Shape 161"/>
+            <p:cNvPr id="159" name="Shape 159"/>
             <p:cNvSpPr/>
             <p:nvPr/>
           </p:nvSpPr>
@@ -5697,14 +5712,14 @@
         </p:sp>
         <p:pic>
           <p:nvPicPr>
-            <p:cNvPr id="162" name="person.jpg"/>
+            <p:cNvPr id="160" name="person.jpg"/>
             <p:cNvPicPr>
               <a:picLocks noChangeAspect="1"/>
             </p:cNvPicPr>
             <p:nvPr/>
           </p:nvPicPr>
           <p:blipFill>
-            <a:blip r:embed="rId2">
+            <a:blip r:embed="rId3">
               <a:extLst/>
             </a:blip>
             <a:stretch>
@@ -5729,7 +5744,7 @@
       </p:grpSp>
       <p:sp>
         <p:nvSpPr>
-          <p:cNvPr id="164" name="Shape 164"/>
+          <p:cNvPr id="162" name="Shape 162"/>
           <p:cNvSpPr/>
           <p:nvPr/>
         </p:nvSpPr>
@@ -5798,7 +5813,7 @@
                                       <p:cBhvr>
                                         <p:cTn id="6" fill="hold"/>
                                         <p:tgtEl>
-                                          <p:spTgt spid="148"/>
+                                          <p:spTgt spid="146"/>
                                         </p:tgtEl>
                                         <p:attrNameLst>
                                           <p:attrName>style.visibility</p:attrName>
@@ -5842,7 +5857,7 @@
                                       <p:cBhvr>
                                         <p:cTn id="10" fill="hold"/>
                                         <p:tgtEl>
-                                          <p:spTgt spid="164"/>
+                                          <p:spTgt spid="162"/>
                                         </p:tgtEl>
                                         <p:attrNameLst>
                                           <p:attrName>style.visibility</p:attrName>
@@ -5877,7 +5892,7 @@
                                       <p:cBhvr>
                                         <p:cTn id="13" fill="hold"/>
                                         <p:tgtEl>
-                                          <p:spTgt spid="151"/>
+                                          <p:spTgt spid="149"/>
                                         </p:tgtEl>
                                         <p:attrNameLst>
                                           <p:attrName>style.visibility</p:attrName>
@@ -5921,7 +5936,7 @@
                                       <p:cBhvr>
                                         <p:cTn id="17" fill="hold"/>
                                         <p:tgtEl>
-                                          <p:spTgt spid="154"/>
+                                          <p:spTgt spid="152"/>
                                         </p:tgtEl>
                                         <p:attrNameLst>
                                           <p:attrName>style.visibility</p:attrName>
@@ -5965,7 +5980,7 @@
                                       <p:cBhvr>
                                         <p:cTn id="21" fill="hold"/>
                                         <p:tgtEl>
-                                          <p:spTgt spid="157"/>
+                                          <p:spTgt spid="155"/>
                                         </p:tgtEl>
                                         <p:attrNameLst>
                                           <p:attrName>style.visibility</p:attrName>
@@ -6009,7 +6024,7 @@
                                       <p:cBhvr>
                                         <p:cTn id="25" fill="hold"/>
                                         <p:tgtEl>
-                                          <p:spTgt spid="160"/>
+                                          <p:spTgt spid="158"/>
                                         </p:tgtEl>
                                         <p:attrNameLst>
                                           <p:attrName>style.visibility</p:attrName>
@@ -6053,7 +6068,7 @@
                                       <p:cBhvr>
                                         <p:cTn id="29" fill="hold"/>
                                         <p:tgtEl>
-                                          <p:spTgt spid="163"/>
+                                          <p:spTgt spid="161"/>
                                         </p:tgtEl>
                                         <p:attrNameLst>
                                           <p:attrName>style.visibility</p:attrName>
@@ -6094,13 +6109,13 @@
       </p:par>
     </p:tnLst>
     <p:bldLst>
-      <p:bldP build="whole" bldLvl="1" animBg="1" rev="0" advAuto="0" spid="164" grpId="2"/>
-      <p:bldP build="whole" bldLvl="1" animBg="1" rev="0" advAuto="0" spid="160" grpId="6"/>
-      <p:bldP build="whole" bldLvl="1" animBg="1" rev="0" advAuto="0" spid="151" grpId="3"/>
-      <p:bldP build="whole" bldLvl="1" animBg="1" rev="0" advAuto="0" spid="154" grpId="4"/>
-      <p:bldP build="whole" bldLvl="1" animBg="1" rev="0" advAuto="0" spid="157" grpId="5"/>
-      <p:bldP build="whole" bldLvl="1" animBg="1" rev="0" advAuto="0" spid="163" grpId="7"/>
-      <p:bldP build="whole" bldLvl="1" animBg="1" rev="0" advAuto="0" spid="148" grpId="1"/>
+      <p:bldP build="whole" bldLvl="1" animBg="1" rev="0" advAuto="0" spid="158" grpId="6"/>
+      <p:bldP build="whole" bldLvl="1" animBg="1" rev="0" advAuto="0" spid="149" grpId="3"/>
+      <p:bldP build="whole" bldLvl="1" animBg="1" rev="0" advAuto="0" spid="155" grpId="5"/>
+      <p:bldP build="whole" bldLvl="1" animBg="1" rev="0" advAuto="0" spid="162" grpId="2"/>
+      <p:bldP build="whole" bldLvl="1" animBg="1" rev="0" advAuto="0" spid="161" grpId="7"/>
+      <p:bldP build="whole" bldLvl="1" animBg="1" rev="0" advAuto="0" spid="146" grpId="1"/>
+      <p:bldP build="whole" bldLvl="1" animBg="1" rev="0" advAuto="0" spid="152" grpId="4"/>
     </p:bldLst>
   </p:timing>
 </p:sld>
@@ -6594,7 +6609,7 @@
         </p:nvSpPr>
         <p:spPr>
           <a:xfrm>
-            <a:off x="5461288" y="5407460"/>
+            <a:off x="4686588" y="5407460"/>
             <a:ext cx="774548" cy="3709029"/>
           </a:xfrm>
           <a:prstGeom prst="rect">
@@ -6625,7 +6640,7 @@
         </p:nvSpPr>
         <p:spPr>
           <a:xfrm>
-            <a:off x="4254479" y="3156690"/>
+            <a:off x="4254479" y="2902690"/>
             <a:ext cx="2830794" cy="271560"/>
           </a:xfrm>
           <a:prstGeom prst="rect">
@@ -7089,12 +7104,12 @@
       </p:par>
     </p:tnLst>
     <p:bldLst>
-      <p:bldP build="whole" bldLvl="1" animBg="1" rev="0" advAuto="0" spid="189" grpId="6"/>
-      <p:bldP build="whole" bldLvl="1" animBg="1" rev="0" advAuto="0" spid="185" grpId="1"/>
       <p:bldP build="whole" bldLvl="1" animBg="1" rev="0" advAuto="0" spid="184" grpId="3"/>
       <p:bldP build="whole" bldLvl="1" animBg="1" rev="0" advAuto="0" spid="186" grpId="2"/>
+      <p:bldP build="whole" bldLvl="1" animBg="1" rev="0" advAuto="0" spid="185" grpId="1"/>
+      <p:bldP build="whole" bldLvl="1" animBg="1" rev="0" advAuto="0" spid="188" grpId="5"/>
       <p:bldP build="whole" bldLvl="1" animBg="1" rev="0" advAuto="0" spid="187" grpId="4"/>
-      <p:bldP build="whole" bldLvl="1" animBg="1" rev="0" advAuto="0" spid="188" grpId="5"/>
+      <p:bldP build="whole" bldLvl="1" animBg="1" rev="0" advAuto="0" spid="189" grpId="6"/>
     </p:bldLst>
   </p:timing>
 </p:sld>
@@ -7200,7 +7215,7 @@
         </p:nvSpPr>
         <p:spPr>
           <a:xfrm>
-            <a:off x="4254479" y="2914085"/>
+            <a:off x="4254479" y="3155385"/>
             <a:ext cx="2830794" cy="271560"/>
           </a:xfrm>
           <a:prstGeom prst="rect">
@@ -7231,7 +7246,7 @@
         </p:nvSpPr>
         <p:spPr>
           <a:xfrm>
-            <a:off x="4688371" y="5407460"/>
+            <a:off x="5437671" y="5407460"/>
             <a:ext cx="774548" cy="3709029"/>
           </a:xfrm>
           <a:prstGeom prst="rect">
@@ -7608,9 +7623,9 @@
       </p:par>
     </p:tnLst>
     <p:bldLst>
+      <p:bldP build="whole" bldLvl="1" animBg="1" rev="0" advAuto="0" spid="202" grpId="2"/>
+      <p:bldP build="whole" bldLvl="1" animBg="1" rev="0" advAuto="0" spid="203" grpId="3"/>
       <p:bldP build="whole" bldLvl="1" animBg="1" rev="0" advAuto="0" spid="201" grpId="1"/>
-      <p:bldP build="whole" bldLvl="1" animBg="1" rev="0" advAuto="0" spid="203" grpId="3"/>
-      <p:bldP build="whole" bldLvl="1" animBg="1" rev="0" advAuto="0" spid="202" grpId="2"/>
     </p:bldLst>
   </p:timing>
 </p:sld>

</xml_diff>

<commit_message>
Minor presentation updates. Made PDF of slides.
</commit_message>
<xml_diff>
--- a/presentation/inaugural_meeting_2016-10-05_presentation.pptx
+++ b/presentation/inaugural_meeting_2016-10-05_presentation.pptx
@@ -896,7 +896,7 @@
       </p:grpSpPr>
       <p:sp>
         <p:nvSpPr>
-          <p:cNvPr id="212" name="Shape 212"/>
+          <p:cNvPr id="213" name="Shape 213"/>
           <p:cNvSpPr/>
           <p:nvPr>
             <p:ph type="sldImg"/>
@@ -917,7 +917,7 @@
       </p:sp>
       <p:sp>
         <p:nvSpPr>
-          <p:cNvPr id="213" name="Shape 213"/>
+          <p:cNvPr id="214" name="Shape 214"/>
           <p:cNvSpPr/>
           <p:nvPr>
             <p:ph type="body" sz="quarter" idx="1"/>
@@ -3666,7 +3666,7 @@
       </p:grpSpPr>
       <p:sp>
         <p:nvSpPr>
-          <p:cNvPr id="205" name="Shape 205"/>
+          <p:cNvPr id="206" name="Shape 206"/>
           <p:cNvSpPr/>
           <p:nvPr/>
         </p:nvSpPr>
@@ -3706,7 +3706,7 @@
       </p:sp>
       <p:sp>
         <p:nvSpPr>
-          <p:cNvPr id="206" name="Shape 206"/>
+          <p:cNvPr id="207" name="Shape 207"/>
           <p:cNvSpPr/>
           <p:nvPr/>
         </p:nvSpPr>
@@ -3746,7 +3746,7 @@
       </p:sp>
       <p:sp>
         <p:nvSpPr>
-          <p:cNvPr id="207" name="Shape 207"/>
+          <p:cNvPr id="208" name="Shape 208"/>
           <p:cNvSpPr/>
           <p:nvPr/>
         </p:nvSpPr>
@@ -3786,7 +3786,7 @@
       </p:sp>
       <p:sp>
         <p:nvSpPr>
-          <p:cNvPr id="208" name="Shape 208"/>
+          <p:cNvPr id="209" name="Shape 209"/>
           <p:cNvSpPr/>
           <p:nvPr/>
         </p:nvSpPr>
@@ -3826,7 +3826,7 @@
       </p:sp>
       <p:pic>
         <p:nvPicPr>
-          <p:cNvPr id="209" name="Rladies2.png"/>
+          <p:cNvPr id="210" name="Rladies2.png"/>
           <p:cNvPicPr>
             <a:picLocks noChangeAspect="1"/>
           </p:cNvPicPr>
@@ -3855,7 +3855,7 @@
       </p:pic>
       <p:pic>
         <p:nvPicPr>
-          <p:cNvPr id="210" name="pasted-image.pdf"/>
+          <p:cNvPr id="211" name="pasted-image.pdf"/>
           <p:cNvPicPr>
             <a:picLocks noChangeAspect="1"/>
           </p:cNvPicPr>
@@ -3884,7 +3884,7 @@
       </p:pic>
       <p:sp>
         <p:nvSpPr>
-          <p:cNvPr id="211" name="Shape 211"/>
+          <p:cNvPr id="212" name="Shape 212"/>
           <p:cNvSpPr/>
           <p:nvPr/>
         </p:nvSpPr>
@@ -3961,7 +3961,7 @@
                                       <p:cBhvr>
                                         <p:cTn id="6" fill="hold"/>
                                         <p:tgtEl>
-                                          <p:spTgt spid="206"/>
+                                          <p:spTgt spid="207"/>
                                         </p:tgtEl>
                                         <p:attrNameLst>
                                           <p:attrName>style.visibility</p:attrName>
@@ -4005,7 +4005,7 @@
                                       <p:cBhvr>
                                         <p:cTn id="10" fill="hold"/>
                                         <p:tgtEl>
-                                          <p:spTgt spid="207"/>
+                                          <p:spTgt spid="208"/>
                                         </p:tgtEl>
                                         <p:attrNameLst>
                                           <p:attrName>style.visibility</p:attrName>
@@ -4049,7 +4049,7 @@
                                       <p:cBhvr>
                                         <p:cTn id="14" fill="hold"/>
                                         <p:tgtEl>
-                                          <p:spTgt spid="211"/>
+                                          <p:spTgt spid="212"/>
                                         </p:tgtEl>
                                         <p:attrNameLst>
                                           <p:attrName>style.visibility</p:attrName>
@@ -4093,7 +4093,7 @@
                                       <p:cBhvr>
                                         <p:cTn id="18" fill="hold"/>
                                         <p:tgtEl>
-                                          <p:spTgt spid="210"/>
+                                          <p:spTgt spid="211"/>
                                         </p:tgtEl>
                                         <p:attrNameLst>
                                           <p:attrName>style.visibility</p:attrName>
@@ -4128,7 +4128,7 @@
                                       <p:cBhvr>
                                         <p:cTn id="21" fill="hold"/>
                                         <p:tgtEl>
-                                          <p:spTgt spid="209"/>
+                                          <p:spTgt spid="210"/>
                                         </p:tgtEl>
                                         <p:attrNameLst>
                                           <p:attrName>style.visibility</p:attrName>
@@ -4163,7 +4163,7 @@
                                       <p:cBhvr>
                                         <p:cTn id="24" fill="hold"/>
                                         <p:tgtEl>
-                                          <p:spTgt spid="208"/>
+                                          <p:spTgt spid="209"/>
                                         </p:tgtEl>
                                         <p:attrNameLst>
                                           <p:attrName>style.visibility</p:attrName>
@@ -4204,12 +4204,12 @@
       </p:par>
     </p:tnLst>
     <p:bldLst>
-      <p:bldP build="whole" bldLvl="1" animBg="1" rev="0" advAuto="0" spid="208" grpId="6"/>
-      <p:bldP build="whole" bldLvl="1" animBg="1" rev="0" advAuto="0" spid="211" grpId="3"/>
-      <p:bldP build="whole" bldLvl="1" animBg="1" rev="0" advAuto="0" spid="206" grpId="1"/>
-      <p:bldP build="whole" bldLvl="1" animBg="1" rev="0" advAuto="0" spid="207" grpId="2"/>
-      <p:bldP build="whole" bldLvl="1" animBg="1" rev="0" advAuto="0" spid="209" grpId="5"/>
-      <p:bldP build="whole" bldLvl="1" animBg="1" rev="0" advAuto="0" spid="210" grpId="4"/>
+      <p:bldP build="whole" bldLvl="1" animBg="1" rev="0" advAuto="0" spid="210" grpId="5"/>
+      <p:bldP build="whole" bldLvl="1" animBg="1" rev="0" advAuto="0" spid="209" grpId="6"/>
+      <p:bldP build="whole" bldLvl="1" animBg="1" rev="0" advAuto="0" spid="211" grpId="4"/>
+      <p:bldP build="whole" bldLvl="1" animBg="1" rev="0" advAuto="0" spid="212" grpId="3"/>
+      <p:bldP build="whole" bldLvl="1" animBg="1" rev="0" advAuto="0" spid="208" grpId="2"/>
+      <p:bldP build="whole" bldLvl="1" animBg="1" rev="0" advAuto="0" spid="207" grpId="1"/>
     </p:bldLst>
   </p:timing>
 </p:sld>
@@ -4454,8 +4454,8 @@
       </p:par>
     </p:tnLst>
     <p:bldLst>
+      <p:bldP build="whole" bldLvl="1" animBg="1" rev="0" advAuto="0" spid="129" grpId="1"/>
       <p:bldP build="whole" bldLvl="1" animBg="1" rev="0" advAuto="0" spid="130" grpId="2"/>
-      <p:bldP build="whole" bldLvl="1" animBg="1" rev="0" advAuto="0" spid="129" grpId="1"/>
     </p:bldLst>
   </p:timing>
 </p:sld>
@@ -6109,13 +6109,13 @@
       </p:par>
     </p:tnLst>
     <p:bldLst>
+      <p:bldP build="whole" bldLvl="1" animBg="1" rev="0" advAuto="0" spid="161" grpId="7"/>
+      <p:bldP build="whole" bldLvl="1" animBg="1" rev="0" advAuto="0" spid="146" grpId="1"/>
       <p:bldP build="whole" bldLvl="1" animBg="1" rev="0" advAuto="0" spid="158" grpId="6"/>
+      <p:bldP build="whole" bldLvl="1" animBg="1" rev="0" advAuto="0" spid="152" grpId="4"/>
       <p:bldP build="whole" bldLvl="1" animBg="1" rev="0" advAuto="0" spid="149" grpId="3"/>
       <p:bldP build="whole" bldLvl="1" animBg="1" rev="0" advAuto="0" spid="155" grpId="5"/>
       <p:bldP build="whole" bldLvl="1" animBg="1" rev="0" advAuto="0" spid="162" grpId="2"/>
-      <p:bldP build="whole" bldLvl="1" animBg="1" rev="0" advAuto="0" spid="161" grpId="7"/>
-      <p:bldP build="whole" bldLvl="1" animBg="1" rev="0" advAuto="0" spid="146" grpId="1"/>
-      <p:bldP build="whole" bldLvl="1" animBg="1" rev="0" advAuto="0" spid="152" grpId="4"/>
     </p:bldLst>
   </p:timing>
 </p:sld>
@@ -7105,11 +7105,11 @@
     </p:tnLst>
     <p:bldLst>
       <p:bldP build="whole" bldLvl="1" animBg="1" rev="0" advAuto="0" spid="184" grpId="3"/>
-      <p:bldP build="whole" bldLvl="1" animBg="1" rev="0" advAuto="0" spid="186" grpId="2"/>
-      <p:bldP build="whole" bldLvl="1" animBg="1" rev="0" advAuto="0" spid="185" grpId="1"/>
       <p:bldP build="whole" bldLvl="1" animBg="1" rev="0" advAuto="0" spid="188" grpId="5"/>
       <p:bldP build="whole" bldLvl="1" animBg="1" rev="0" advAuto="0" spid="187" grpId="4"/>
       <p:bldP build="whole" bldLvl="1" animBg="1" rev="0" advAuto="0" spid="189" grpId="6"/>
+      <p:bldP build="whole" bldLvl="1" animBg="1" rev="0" advAuto="0" spid="185" grpId="1"/>
+      <p:bldP build="whole" bldLvl="1" animBg="1" rev="0" advAuto="0" spid="186" grpId="2"/>
     </p:bldLst>
   </p:timing>
 </p:sld>
@@ -7423,7 +7423,7 @@
         </p:nvSpPr>
         <p:spPr>
           <a:xfrm>
-            <a:off x="2789872" y="6646158"/>
+            <a:off x="2789872" y="8149511"/>
             <a:ext cx="7679056" cy="863601"/>
           </a:xfrm>
           <a:prstGeom prst="rect">
@@ -7451,6 +7451,46 @@
             <a:pPr/>
             <a:r>
               <a:t>Are you in other R groups?</a:t>
+            </a:r>
+          </a:p>
+        </p:txBody>
+      </p:sp>
+      <p:sp>
+        <p:nvSpPr>
+          <p:cNvPr id="204" name="Shape 204"/>
+          <p:cNvSpPr/>
+          <p:nvPr/>
+        </p:nvSpPr>
+        <p:spPr>
+          <a:xfrm>
+            <a:off x="2601912" y="6333760"/>
+            <a:ext cx="8054976" cy="863601"/>
+          </a:xfrm>
+          <a:prstGeom prst="rect">
+            <a:avLst/>
+          </a:prstGeom>
+          <a:ln w="12700">
+            <a:miter lim="400000"/>
+          </a:ln>
+          <a:extLst>
+            <a:ext uri="{C572A759-6A51-4108-AA02-DFA0A04FC94B}">
+              <ma14:wrappingTextBoxFlag xmlns:ma14="http://schemas.microsoft.com/office/mac/drawingml/2011/main" val="1"/>
+            </a:ext>
+          </a:extLst>
+        </p:spPr>
+        <p:txBody>
+          <a:bodyPr wrap="none" lIns="50800" tIns="50800" rIns="50800" bIns="50800" anchor="ctr">
+            <a:spAutoFit/>
+          </a:bodyPr>
+          <a:lstStyle>
+            <a:lvl1pPr>
+              <a:defRPr sz="5000"/>
+            </a:lvl1pPr>
+          </a:lstStyle>
+          <a:p>
+            <a:pPr/>
+            <a:r>
+              <a:t>How long have you used R?</a:t>
             </a:r>
           </a:p>
         </p:txBody>
@@ -7582,6 +7622,50 @@
                                       <p:cBhvr>
                                         <p:cTn id="14" fill="hold"/>
                                         <p:tgtEl>
+                                          <p:spTgt spid="204"/>
+                                        </p:tgtEl>
+                                        <p:attrNameLst>
+                                          <p:attrName>style.visibility</p:attrName>
+                                        </p:attrNameLst>
+                                      </p:cBhvr>
+                                      <p:to>
+                                        <p:strVal val="visible"/>
+                                      </p:to>
+                                    </p:set>
+                                  </p:childTnLst>
+                                </p:cTn>
+                              </p:par>
+                            </p:childTnLst>
+                          </p:cTn>
+                        </p:par>
+                      </p:childTnLst>
+                    </p:cTn>
+                  </p:par>
+                  <p:par>
+                    <p:cTn id="15" fill="hold">
+                      <p:stCondLst>
+                        <p:cond delay="indefinite"/>
+                      </p:stCondLst>
+                      <p:childTnLst>
+                        <p:par>
+                          <p:cTn id="16" fill="hold">
+                            <p:stCondLst>
+                              <p:cond delay="0"/>
+                            </p:stCondLst>
+                            <p:childTnLst>
+                              <p:par>
+                                <p:cTn id="17" presetClass="entr" nodeType="clickEffect" presetSubtype="0" presetID="1" grpId="4" fill="hold">
+                                  <p:stCondLst>
+                                    <p:cond delay="0"/>
+                                  </p:stCondLst>
+                                  <p:iterate type="el" backwards="0">
+                                    <p:tmAbs val="0"/>
+                                  </p:iterate>
+                                  <p:childTnLst>
+                                    <p:set>
+                                      <p:cBhvr>
+                                        <p:cTn id="18" fill="hold"/>
+                                        <p:tgtEl>
                                           <p:spTgt spid="203"/>
                                         </p:tgtEl>
                                         <p:attrNameLst>
@@ -7623,9 +7707,10 @@
       </p:par>
     </p:tnLst>
     <p:bldLst>
+      <p:bldP build="whole" bldLvl="1" animBg="1" rev="0" advAuto="0" spid="201" grpId="1"/>
       <p:bldP build="whole" bldLvl="1" animBg="1" rev="0" advAuto="0" spid="202" grpId="2"/>
-      <p:bldP build="whole" bldLvl="1" animBg="1" rev="0" advAuto="0" spid="203" grpId="3"/>
-      <p:bldP build="whole" bldLvl="1" animBg="1" rev="0" advAuto="0" spid="201" grpId="1"/>
+      <p:bldP build="whole" bldLvl="1" animBg="1" rev="0" advAuto="0" spid="203" grpId="4"/>
+      <p:bldP build="whole" bldLvl="1" animBg="1" rev="0" advAuto="0" spid="204" grpId="3"/>
     </p:bldLst>
   </p:timing>
 </p:sld>

</xml_diff>